<commit_message>
Added jQuery slides to Powerpoint
</commit_message>
<xml_diff>
--- a/2013.May/DevSessions.pptx
+++ b/2013.May/DevSessions.pptx
@@ -5,7 +5,7 @@
     <p:sldMasterId id="2147483648" r:id="rId18"/>
   </p:sldMasterIdLst>
   <p:notesMasterIdLst>
-    <p:notesMasterId r:id="rId28"/>
+    <p:notesMasterId r:id="rId30"/>
   </p:notesMasterIdLst>
   <p:sldIdLst>
     <p:sldId id="256" r:id="rId19"/>
@@ -15,8 +15,10 @@
     <p:sldId id="307" r:id="rId23"/>
     <p:sldId id="316" r:id="rId24"/>
     <p:sldId id="317" r:id="rId25"/>
-    <p:sldId id="302" r:id="rId26"/>
-    <p:sldId id="294" r:id="rId27"/>
+    <p:sldId id="318" r:id="rId26"/>
+    <p:sldId id="319" r:id="rId27"/>
+    <p:sldId id="302" r:id="rId28"/>
+    <p:sldId id="294" r:id="rId29"/>
   </p:sldIdLst>
   <p:sldSz cx="13011150" cy="7315200"/>
   <p:notesSz cx="6858000" cy="9144000"/>
@@ -117,7 +119,7 @@
   </p:defaultTextStyle>
   <p:extLst>
     <p:ext uri="{EFAFB233-063F-42B5-8137-9DF3F51BA10A}">
-      <p15:sldGuideLst xmlns:p15="http://schemas.microsoft.com/office/powerpoint/2012/main">
+      <p15:sldGuideLst xmlns:p15="http://schemas.microsoft.com/office/powerpoint/2012/main" xmlns="">
         <p15:guide id="1" orient="horz" pos="2304">
           <p15:clr>
             <a:srgbClr val="A4A3A4"/>
@@ -216,7 +218,7 @@
           <a:p>
             <a:fld id="{9E573305-2F6D-4CEB-A3E8-FF02FB030534}" type="datetimeFigureOut">
               <a:rPr lang="en-AU" smtClean="0"/>
-              <a:t>6/06/2013</a:t>
+              <a:t>7/06/2013</a:t>
             </a:fld>
             <a:endParaRPr lang="en-AU"/>
           </a:p>
@@ -1046,6 +1048,238 @@
             <a:fld id="{0BF20BA8-12AF-476D-99B2-894C09A4EE62}" type="slidenum">
               <a:rPr lang="en-GB" smtClean="0"/>
               <a:t>7</a:t>
+            </a:fld>
+            <a:endParaRPr lang="en-GB"/>
+          </a:p>
+        </p:txBody>
+      </p:sp>
+    </p:spTree>
+    <p:extLst>
+      <p:ext uri="{BB962C8B-B14F-4D97-AF65-F5344CB8AC3E}">
+        <p14:creationId xmlns:p14="http://schemas.microsoft.com/office/powerpoint/2010/main" val="1548148240"/>
+      </p:ext>
+    </p:extLst>
+  </p:cSld>
+  <p:clrMapOvr>
+    <a:masterClrMapping/>
+  </p:clrMapOvr>
+</p:notes>
+</file>
+
+<file path=ppt/notesSlides/notesSlide6.xml><?xml version="1.0" encoding="utf-8"?>
+<p:notes xmlns:a="http://schemas.openxmlformats.org/drawingml/2006/main" xmlns:r="http://schemas.openxmlformats.org/officeDocument/2006/relationships" xmlns:p="http://schemas.openxmlformats.org/presentationml/2006/main">
+  <p:cSld>
+    <p:spTree>
+      <p:nvGrpSpPr>
+        <p:cNvPr id="1" name=""/>
+        <p:cNvGrpSpPr/>
+        <p:nvPr/>
+      </p:nvGrpSpPr>
+      <p:grpSpPr>
+        <a:xfrm>
+          <a:off x="0" y="0"/>
+          <a:ext cx="0" cy="0"/>
+          <a:chOff x="0" y="0"/>
+          <a:chExt cx="0" cy="0"/>
+        </a:xfrm>
+      </p:grpSpPr>
+      <p:sp>
+        <p:nvSpPr>
+          <p:cNvPr id="2" name="Slide Image Placeholder 1"/>
+          <p:cNvSpPr>
+            <a:spLocks noGrp="1" noRot="1" noChangeAspect="1"/>
+          </p:cNvSpPr>
+          <p:nvPr>
+            <p:ph type="sldImg"/>
+          </p:nvPr>
+        </p:nvSpPr>
+        <p:spPr/>
+      </p:sp>
+      <p:sp>
+        <p:nvSpPr>
+          <p:cNvPr id="3" name="Notes Placeholder 2"/>
+          <p:cNvSpPr>
+            <a:spLocks noGrp="1"/>
+          </p:cNvSpPr>
+          <p:nvPr>
+            <p:ph type="body" idx="1"/>
+          </p:nvPr>
+        </p:nvSpPr>
+        <p:spPr/>
+        <p:txBody>
+          <a:bodyPr/>
+          <a:lstStyle/>
+          <a:p>
+            <a:pPr marL="171450" indent="-171450">
+              <a:buFontTx/>
+              <a:buChar char="-"/>
+            </a:pPr>
+            <a:r>
+              <a:rPr lang="en-AU" dirty="0" smtClean="0"/>
+              <a:t>Walkthrough of what it achieves</a:t>
+            </a:r>
+            <a:r>
+              <a:rPr lang="en-AU" baseline="0" dirty="0"/>
+              <a:t> </a:t>
+            </a:r>
+            <a:r>
+              <a:rPr lang="en-AU" baseline="0" dirty="0" smtClean="0"/>
+              <a:t>and why its useful</a:t>
+            </a:r>
+          </a:p>
+          <a:p>
+            <a:pPr marL="171450" indent="-171450">
+              <a:buFontTx/>
+              <a:buChar char="-"/>
+            </a:pPr>
+            <a:r>
+              <a:rPr lang="en-AU" baseline="0" dirty="0" smtClean="0"/>
+              <a:t>Short code sample (or split onto second page?)</a:t>
+            </a:r>
+          </a:p>
+          <a:p>
+            <a:pPr marL="171450" indent="-171450">
+              <a:buFontTx/>
+              <a:buChar char="-"/>
+            </a:pPr>
+            <a:endParaRPr lang="en-AU" dirty="0" smtClean="0"/>
+          </a:p>
+        </p:txBody>
+      </p:sp>
+      <p:sp>
+        <p:nvSpPr>
+          <p:cNvPr id="4" name="Slide Number Placeholder 3"/>
+          <p:cNvSpPr>
+            <a:spLocks noGrp="1"/>
+          </p:cNvSpPr>
+          <p:nvPr>
+            <p:ph type="sldNum" sz="quarter" idx="10"/>
+          </p:nvPr>
+        </p:nvSpPr>
+        <p:spPr/>
+        <p:txBody>
+          <a:bodyPr/>
+          <a:lstStyle/>
+          <a:p>
+            <a:fld id="{0BF20BA8-12AF-476D-99B2-894C09A4EE62}" type="slidenum">
+              <a:rPr lang="en-GB" smtClean="0"/>
+              <a:t>8</a:t>
+            </a:fld>
+            <a:endParaRPr lang="en-GB"/>
+          </a:p>
+        </p:txBody>
+      </p:sp>
+    </p:spTree>
+    <p:extLst>
+      <p:ext uri="{BB962C8B-B14F-4D97-AF65-F5344CB8AC3E}">
+        <p14:creationId xmlns:p14="http://schemas.microsoft.com/office/powerpoint/2010/main" val="1548148240"/>
+      </p:ext>
+    </p:extLst>
+  </p:cSld>
+  <p:clrMapOvr>
+    <a:masterClrMapping/>
+  </p:clrMapOvr>
+</p:notes>
+</file>
+
+<file path=ppt/notesSlides/notesSlide7.xml><?xml version="1.0" encoding="utf-8"?>
+<p:notes xmlns:a="http://schemas.openxmlformats.org/drawingml/2006/main" xmlns:r="http://schemas.openxmlformats.org/officeDocument/2006/relationships" xmlns:p="http://schemas.openxmlformats.org/presentationml/2006/main">
+  <p:cSld>
+    <p:spTree>
+      <p:nvGrpSpPr>
+        <p:cNvPr id="1" name=""/>
+        <p:cNvGrpSpPr/>
+        <p:nvPr/>
+      </p:nvGrpSpPr>
+      <p:grpSpPr>
+        <a:xfrm>
+          <a:off x="0" y="0"/>
+          <a:ext cx="0" cy="0"/>
+          <a:chOff x="0" y="0"/>
+          <a:chExt cx="0" cy="0"/>
+        </a:xfrm>
+      </p:grpSpPr>
+      <p:sp>
+        <p:nvSpPr>
+          <p:cNvPr id="2" name="Slide Image Placeholder 1"/>
+          <p:cNvSpPr>
+            <a:spLocks noGrp="1" noRot="1" noChangeAspect="1"/>
+          </p:cNvSpPr>
+          <p:nvPr>
+            <p:ph type="sldImg"/>
+          </p:nvPr>
+        </p:nvSpPr>
+        <p:spPr/>
+      </p:sp>
+      <p:sp>
+        <p:nvSpPr>
+          <p:cNvPr id="3" name="Notes Placeholder 2"/>
+          <p:cNvSpPr>
+            <a:spLocks noGrp="1"/>
+          </p:cNvSpPr>
+          <p:nvPr>
+            <p:ph type="body" idx="1"/>
+          </p:nvPr>
+        </p:nvSpPr>
+        <p:spPr/>
+        <p:txBody>
+          <a:bodyPr/>
+          <a:lstStyle/>
+          <a:p>
+            <a:pPr marL="171450" indent="-171450">
+              <a:buFontTx/>
+              <a:buChar char="-"/>
+            </a:pPr>
+            <a:r>
+              <a:rPr lang="en-AU" dirty="0" smtClean="0"/>
+              <a:t>Walkthrough of what it achieves</a:t>
+            </a:r>
+            <a:r>
+              <a:rPr lang="en-AU" baseline="0" dirty="0"/>
+              <a:t> </a:t>
+            </a:r>
+            <a:r>
+              <a:rPr lang="en-AU" baseline="0" dirty="0" smtClean="0"/>
+              <a:t>and why its useful</a:t>
+            </a:r>
+          </a:p>
+          <a:p>
+            <a:pPr marL="171450" indent="-171450">
+              <a:buFontTx/>
+              <a:buChar char="-"/>
+            </a:pPr>
+            <a:r>
+              <a:rPr lang="en-AU" baseline="0" dirty="0" smtClean="0"/>
+              <a:t>Short code sample (or split onto second page?)</a:t>
+            </a:r>
+          </a:p>
+          <a:p>
+            <a:pPr marL="171450" indent="-171450">
+              <a:buFontTx/>
+              <a:buChar char="-"/>
+            </a:pPr>
+            <a:endParaRPr lang="en-AU" dirty="0" smtClean="0"/>
+          </a:p>
+        </p:txBody>
+      </p:sp>
+      <p:sp>
+        <p:nvSpPr>
+          <p:cNvPr id="4" name="Slide Number Placeholder 3"/>
+          <p:cNvSpPr>
+            <a:spLocks noGrp="1"/>
+          </p:cNvSpPr>
+          <p:nvPr>
+            <p:ph type="sldNum" sz="quarter" idx="10"/>
+          </p:nvPr>
+        </p:nvSpPr>
+        <p:spPr/>
+        <p:txBody>
+          <a:bodyPr/>
+          <a:lstStyle/>
+          <a:p>
+            <a:fld id="{0BF20BA8-12AF-476D-99B2-894C09A4EE62}" type="slidenum">
+              <a:rPr lang="en-GB" smtClean="0"/>
+              <a:t>9</a:t>
             </a:fld>
             <a:endParaRPr lang="en-GB"/>
           </a:p>
@@ -12314,23 +12548,7 @@
                 <a:ea typeface="Segoe UI" pitchFamily="34" charset="0"/>
                 <a:cs typeface="Segoe UI" pitchFamily="34" charset="0"/>
               </a:rPr>
-              <a:t> Sessions – </a:t>
-            </a:r>
-            <a:r>
-              <a:rPr lang="en-US" sz="4400" dirty="0" smtClean="0">
-                <a:latin typeface="Segoe UI" pitchFamily="34" charset="0"/>
-                <a:ea typeface="Segoe UI" pitchFamily="34" charset="0"/>
-                <a:cs typeface="Segoe UI" pitchFamily="34" charset="0"/>
-              </a:rPr>
-              <a:t>May </a:t>
-            </a:r>
-            <a:r>
-              <a:rPr lang="en-US" sz="4400" dirty="0" smtClean="0">
-                <a:latin typeface="Segoe UI" pitchFamily="34" charset="0"/>
-                <a:ea typeface="Segoe UI" pitchFamily="34" charset="0"/>
-                <a:cs typeface="Segoe UI" pitchFamily="34" charset="0"/>
-              </a:rPr>
-              <a:t>2013</a:t>
+              <a:t> Sessions – May 2013</a:t>
             </a:r>
           </a:p>
         </p:txBody>
@@ -15903,6 +16121,252 @@
 </p:sld>
 </file>
 
+<file path=ppt/slides/slide10.xml><?xml version="1.0" encoding="utf-8"?>
+<p:sld xmlns:a="http://schemas.openxmlformats.org/drawingml/2006/main" xmlns:r="http://schemas.openxmlformats.org/officeDocument/2006/relationships" xmlns:p="http://schemas.openxmlformats.org/presentationml/2006/main">
+  <p:cSld>
+    <p:spTree>
+      <p:nvGrpSpPr>
+        <p:cNvPr id="1" name=""/>
+        <p:cNvGrpSpPr/>
+        <p:nvPr/>
+      </p:nvGrpSpPr>
+      <p:grpSpPr>
+        <a:xfrm>
+          <a:off x="0" y="0"/>
+          <a:ext cx="0" cy="0"/>
+          <a:chOff x="0" y="0"/>
+          <a:chExt cx="0" cy="0"/>
+        </a:xfrm>
+      </p:grpSpPr>
+      <p:sp>
+        <p:nvSpPr>
+          <p:cNvPr id="2" name="Title 1"/>
+          <p:cNvSpPr>
+            <a:spLocks noGrp="1"/>
+          </p:cNvSpPr>
+          <p:nvPr>
+            <p:ph type="title"/>
+          </p:nvPr>
+        </p:nvSpPr>
+        <p:spPr/>
+        <p:txBody>
+          <a:bodyPr/>
+          <a:lstStyle/>
+          <a:p>
+            <a:r>
+              <a:rPr lang="en-US" dirty="0" smtClean="0"/>
+              <a:t>Demo</a:t>
+            </a:r>
+            <a:endParaRPr lang="hr-HR" dirty="0"/>
+          </a:p>
+        </p:txBody>
+      </p:sp>
+    </p:spTree>
+    <p:extLst>
+      <p:ext uri="{BB962C8B-B14F-4D97-AF65-F5344CB8AC3E}">
+        <p14:creationId xmlns:p14="http://schemas.microsoft.com/office/powerpoint/2010/main" val="3997771631"/>
+      </p:ext>
+    </p:extLst>
+  </p:cSld>
+  <p:clrMapOvr>
+    <a:masterClrMapping/>
+  </p:clrMapOvr>
+  <mc:AlternateContent xmlns:mc="http://schemas.openxmlformats.org/markup-compatibility/2006" xmlns:p14="http://schemas.microsoft.com/office/powerpoint/2010/main">
+    <mc:Choice Requires="p14">
+      <p:transition spd="med" p14:dur="700" advClick="0" advTm="1000">
+        <p:fade/>
+      </p:transition>
+    </mc:Choice>
+    <mc:Fallback xmlns="">
+      <p:transition spd="med" advClick="0" advTm="1000">
+        <p:fade/>
+      </p:transition>
+    </mc:Fallback>
+  </mc:AlternateContent>
+  <p:timing>
+    <p:tnLst>
+      <p:par>
+        <p:cTn id="1" dur="indefinite" restart="never" nodeType="tmRoot"/>
+      </p:par>
+    </p:tnLst>
+  </p:timing>
+</p:sld>
+</file>
+
+<file path=ppt/slides/slide11.xml><?xml version="1.0" encoding="utf-8"?>
+<p:sld xmlns:a="http://schemas.openxmlformats.org/drawingml/2006/main" xmlns:r="http://schemas.openxmlformats.org/officeDocument/2006/relationships" xmlns:p="http://schemas.openxmlformats.org/presentationml/2006/main">
+  <p:cSld>
+    <p:spTree>
+      <p:nvGrpSpPr>
+        <p:cNvPr id="1" name=""/>
+        <p:cNvGrpSpPr/>
+        <p:nvPr/>
+      </p:nvGrpSpPr>
+      <p:grpSpPr>
+        <a:xfrm>
+          <a:off x="0" y="0"/>
+          <a:ext cx="0" cy="0"/>
+          <a:chOff x="0" y="0"/>
+          <a:chExt cx="0" cy="0"/>
+        </a:xfrm>
+      </p:grpSpPr>
+      <p:sp>
+        <p:nvSpPr>
+          <p:cNvPr id="2" name="Title 1"/>
+          <p:cNvSpPr>
+            <a:spLocks noGrp="1"/>
+          </p:cNvSpPr>
+          <p:nvPr>
+            <p:ph type="title"/>
+          </p:nvPr>
+        </p:nvSpPr>
+        <p:spPr/>
+        <p:txBody>
+          <a:bodyPr/>
+          <a:lstStyle/>
+          <a:p>
+            <a:r>
+              <a:rPr lang="en-US" dirty="0" smtClean="0"/>
+              <a:t>Ideas for next month?</a:t>
+            </a:r>
+            <a:endParaRPr lang="hr-HR" dirty="0"/>
+          </a:p>
+        </p:txBody>
+      </p:sp>
+      <p:pic>
+        <p:nvPicPr>
+          <p:cNvPr id="4" name="Picture 2" descr="C:\Users\t-dantay\Documents\Placeholders\home.png"/>
+          <p:cNvPicPr>
+            <a:picLocks noChangeAspect="1" noChangeArrowheads="1"/>
+          </p:cNvPicPr>
+          <p:nvPr>
+            <p:custDataLst>
+              <p:custData r:id="rId1"/>
+            </p:custDataLst>
+          </p:nvPr>
+        </p:nvPicPr>
+        <p:blipFill>
+          <a:blip r:embed="rId3" cstate="print">
+            <a:extLst>
+              <a:ext uri="{28A0092B-C50C-407E-A947-70E740481C1C}">
+                <a14:useLocalDpi xmlns:a14="http://schemas.microsoft.com/office/drawing/2010/main" val="0"/>
+              </a:ext>
+            </a:extLst>
+          </a:blip>
+          <a:srcRect/>
+          <a:stretch>
+            <a:fillRect/>
+          </a:stretch>
+        </p:blipFill>
+        <p:spPr bwMode="auto">
+          <a:xfrm>
+            <a:off x="2980071" y="5203329"/>
+            <a:ext cx="888396" cy="874514"/>
+          </a:xfrm>
+          <a:prstGeom prst="rect">
+            <a:avLst/>
+          </a:prstGeom>
+          <a:noFill/>
+          <a:extLst>
+            <a:ext uri="{909E8E84-426E-40DD-AFC4-6F175D3DCCD1}">
+              <a14:hiddenFill xmlns:a14="http://schemas.microsoft.com/office/drawing/2010/main">
+                <a:solidFill>
+                  <a:srgbClr val="FFFFFF"/>
+                </a:solidFill>
+              </a14:hiddenFill>
+            </a:ext>
+          </a:extLst>
+        </p:spPr>
+      </p:pic>
+      <p:sp>
+        <p:nvSpPr>
+          <p:cNvPr id="5" name="TextBox 4"/>
+          <p:cNvSpPr txBox="1"/>
+          <p:nvPr/>
+        </p:nvSpPr>
+        <p:spPr>
+          <a:xfrm>
+            <a:off x="3931967" y="5406530"/>
+            <a:ext cx="7155133" cy="523220"/>
+          </a:xfrm>
+          <a:prstGeom prst="rect">
+            <a:avLst/>
+          </a:prstGeom>
+          <a:noFill/>
+        </p:spPr>
+        <p:txBody>
+          <a:bodyPr wrap="square" rtlCol="0">
+            <a:spAutoFit/>
+          </a:bodyPr>
+          <a:lstStyle/>
+          <a:p>
+            <a:r>
+              <a:rPr lang="en-AU" sz="2800" dirty="0" smtClean="0">
+                <a:latin typeface="Segoe UI Light" pitchFamily="34" charset="0"/>
+                <a:cs typeface="Segoe UI Light" pitchFamily="34" charset="0"/>
+              </a:rPr>
+              <a:t>github.com/</a:t>
+            </a:r>
+            <a:r>
+              <a:rPr lang="en-AU" sz="2800" dirty="0" err="1" smtClean="0">
+                <a:latin typeface="Segoe UI Light" pitchFamily="34" charset="0"/>
+                <a:cs typeface="Segoe UI Light" pitchFamily="34" charset="0"/>
+              </a:rPr>
+              <a:t>dougrathbone</a:t>
+            </a:r>
+            <a:r>
+              <a:rPr lang="en-AU" sz="2800" dirty="0" smtClean="0">
+                <a:latin typeface="Segoe UI Light" pitchFamily="34" charset="0"/>
+                <a:cs typeface="Segoe UI Light" pitchFamily="34" charset="0"/>
+              </a:rPr>
+              <a:t>/</a:t>
+            </a:r>
+            <a:r>
+              <a:rPr lang="en-AU" sz="2800" dirty="0" err="1" smtClean="0">
+                <a:latin typeface="Segoe UI Light" pitchFamily="34" charset="0"/>
+                <a:cs typeface="Segoe UI Light" pitchFamily="34" charset="0"/>
+              </a:rPr>
+              <a:t>bauerdevsessions</a:t>
+            </a:r>
+            <a:endParaRPr lang="en-AU" sz="2800" dirty="0">
+              <a:latin typeface="Segoe UI Light" pitchFamily="34" charset="0"/>
+              <a:cs typeface="Segoe UI Light" pitchFamily="34" charset="0"/>
+            </a:endParaRPr>
+          </a:p>
+        </p:txBody>
+      </p:sp>
+    </p:spTree>
+    <p:extLst>
+      <p:ext uri="{BB962C8B-B14F-4D97-AF65-F5344CB8AC3E}">
+        <p14:creationId xmlns:p14="http://schemas.microsoft.com/office/powerpoint/2010/main" val="2051119352"/>
+      </p:ext>
+    </p:extLst>
+  </p:cSld>
+  <p:clrMapOvr>
+    <a:masterClrMapping/>
+  </p:clrMapOvr>
+  <mc:AlternateContent xmlns:mc="http://schemas.openxmlformats.org/markup-compatibility/2006" xmlns:p14="http://schemas.microsoft.com/office/powerpoint/2010/main">
+    <mc:Choice Requires="p14">
+      <p:transition spd="med" p14:dur="700" advClick="0" advTm="1000">
+        <p:fade/>
+      </p:transition>
+    </mc:Choice>
+    <mc:Fallback xmlns="">
+      <p:transition spd="med" advClick="0" advTm="1000">
+        <p:fade/>
+      </p:transition>
+    </mc:Fallback>
+  </mc:AlternateContent>
+  <p:timing>
+    <p:tnLst>
+      <p:par>
+        <p:cTn id="1" dur="indefinite" restart="never" nodeType="tmRoot"/>
+      </p:par>
+    </p:tnLst>
+  </p:timing>
+</p:sld>
+</file>
+
 <file path=ppt/slides/slide2.xml><?xml version="1.0" encoding="utf-8"?>
 <p:sld xmlns:a="http://schemas.openxmlformats.org/drawingml/2006/main" xmlns:r="http://schemas.openxmlformats.org/officeDocument/2006/relationships" xmlns:p="http://schemas.openxmlformats.org/presentationml/2006/main">
   <p:cSld>
@@ -16010,11 +16474,7 @@
             <a:pPr algn="l"/>
             <a:r>
               <a:rPr lang="en-US" dirty="0" smtClean="0"/>
-              <a:t>linq</a:t>
-            </a:r>
-            <a:r>
-              <a:rPr lang="en-US" dirty="0" smtClean="0"/>
-              <a:t>.js</a:t>
+              <a:t>linq.js</a:t>
             </a:r>
             <a:endParaRPr lang="hr-HR" dirty="0"/>
           </a:p>
@@ -16041,11 +16501,7 @@
           <a:p>
             <a:r>
               <a:rPr lang="en-GB" dirty="0" smtClean="0"/>
-              <a:t>linq</a:t>
-            </a:r>
-            <a:r>
-              <a:rPr lang="en-GB" dirty="0" smtClean="0"/>
-              <a:t>.js</a:t>
+              <a:t>linq.js</a:t>
             </a:r>
             <a:endParaRPr lang="en-GB" dirty="0"/>
           </a:p>
@@ -16072,11 +16528,7 @@
           <a:p>
             <a:r>
               <a:rPr lang="en-AU" sz="2400" dirty="0" smtClean="0"/>
-              <a:t>http</a:t>
-            </a:r>
-            <a:r>
-              <a:rPr lang="en-AU" sz="2400" dirty="0" smtClean="0"/>
-              <a:t>://linqjs.codeplex.com</a:t>
+              <a:t>http://linqjs.codeplex.com</a:t>
             </a:r>
             <a:endParaRPr lang="en-GB" sz="2400" dirty="0"/>
           </a:p>
@@ -16101,7 +16553,6 @@
               <a:rPr lang="en-AU" dirty="0" smtClean="0"/>
               <a:t>What is linq.js?</a:t>
             </a:r>
-            <a:endParaRPr lang="en-AU" dirty="0" smtClean="0"/>
           </a:p>
           <a:p>
             <a:pPr marL="571500" indent="-571500">
@@ -16626,11 +17077,7 @@
             <a:pPr algn="l"/>
             <a:r>
               <a:rPr lang="en-US" dirty="0" smtClean="0"/>
-              <a:t>linq</a:t>
-            </a:r>
-            <a:r>
-              <a:rPr lang="en-US" dirty="0" smtClean="0"/>
-              <a:t>.js</a:t>
+              <a:t>linq.js</a:t>
             </a:r>
             <a:endParaRPr lang="hr-HR" dirty="0"/>
           </a:p>
@@ -16657,11 +17104,7 @@
           <a:p>
             <a:r>
               <a:rPr lang="en-GB" dirty="0" smtClean="0"/>
-              <a:t>linq</a:t>
-            </a:r>
-            <a:r>
-              <a:rPr lang="en-GB" dirty="0" smtClean="0"/>
-              <a:t>.js</a:t>
+              <a:t>linq.js</a:t>
             </a:r>
             <a:endParaRPr lang="en-GB" dirty="0"/>
           </a:p>
@@ -16688,11 +17131,7 @@
           <a:p>
             <a:r>
               <a:rPr lang="en-AU" sz="2400" dirty="0" smtClean="0"/>
-              <a:t>http</a:t>
-            </a:r>
-            <a:r>
-              <a:rPr lang="en-AU" sz="2400" dirty="0" smtClean="0"/>
-              <a:t>://linqjs.codeplex.com</a:t>
+              <a:t>http://linqjs.codeplex.com</a:t>
             </a:r>
             <a:endParaRPr lang="en-GB" sz="2400" dirty="0"/>
           </a:p>
@@ -16717,7 +17156,6 @@
               <a:rPr lang="en-AU" dirty="0" smtClean="0"/>
               <a:t>Three ways to express filters</a:t>
             </a:r>
-            <a:endParaRPr lang="en-AU" dirty="0" smtClean="0"/>
           </a:p>
           <a:p>
             <a:pPr marL="571500" indent="-571500">
@@ -17171,13 +17609,13 @@
   <p:clrMapOvr>
     <a:masterClrMapping/>
   </p:clrMapOvr>
-  <mc:AlternateContent xmlns:mc="http://schemas.openxmlformats.org/markup-compatibility/2006">
-    <mc:Choice xmlns:p14="http://schemas.microsoft.com/office/powerpoint/2010/main" Requires="p14">
+  <mc:AlternateContent xmlns:mc="http://schemas.openxmlformats.org/markup-compatibility/2006" xmlns:p14="http://schemas.microsoft.com/office/powerpoint/2010/main">
+    <mc:Choice Requires="p14">
       <p:transition spd="med" p14:dur="700">
         <p:fade/>
       </p:transition>
     </mc:Choice>
-    <mc:Fallback>
+    <mc:Fallback xmlns="">
       <p:transition spd="med">
         <p:fade/>
       </p:transition>
@@ -17282,11 +17720,7 @@
           <a:p>
             <a:r>
               <a:rPr lang="en-AU" sz="2400" dirty="0" smtClean="0"/>
-              <a:t>http</a:t>
-            </a:r>
-            <a:r>
-              <a:rPr lang="en-AU" sz="2400" dirty="0" smtClean="0"/>
-              <a:t>://linqjs.codeplex.com</a:t>
+              <a:t>http://linqjs.codeplex.com</a:t>
             </a:r>
             <a:endParaRPr lang="en-GB" sz="2400" dirty="0"/>
           </a:p>
@@ -17311,7 +17745,6 @@
               <a:rPr lang="en-AU" dirty="0" smtClean="0"/>
               <a:t>Filter with regular JS function</a:t>
             </a:r>
-            <a:endParaRPr lang="en-AU" dirty="0" smtClean="0"/>
           </a:p>
           <a:p>
             <a:pPr marL="571500" indent="-571500">
@@ -17636,14 +18069,7 @@
                 <a:latin typeface="Segoe UI Light" pitchFamily="34" charset="0"/>
                 <a:cs typeface="Segoe UI Light" pitchFamily="34" charset="0"/>
               </a:rPr>
-              <a:t>		</a:t>
-            </a:r>
-            <a:r>
-              <a:rPr lang="en-AU" sz="2000" dirty="0" smtClean="0">
-                <a:latin typeface="Segoe UI Light" pitchFamily="34" charset="0"/>
-                <a:cs typeface="Segoe UI Light" pitchFamily="34" charset="0"/>
-              </a:rPr>
-              <a:t>.where(function(x) { return x % 2 === 0;});</a:t>
+              <a:t>		.where(function(x) { return x % 2 === 0;});</a:t>
             </a:r>
           </a:p>
           <a:p>
@@ -18028,11 +18454,7 @@
           <a:p>
             <a:r>
               <a:rPr lang="en-AU" sz="2400" dirty="0" smtClean="0"/>
-              <a:t>http</a:t>
-            </a:r>
-            <a:r>
-              <a:rPr lang="en-AU" sz="2400" dirty="0" smtClean="0"/>
-              <a:t>://linqjs.codeplex.com</a:t>
+              <a:t>http://linqjs.codeplex.com</a:t>
             </a:r>
             <a:endParaRPr lang="en-GB" sz="2400" dirty="0"/>
           </a:p>
@@ -18057,7 +18479,6 @@
               <a:rPr lang="en-AU" dirty="0" smtClean="0"/>
               <a:t>Filter with LINQ-style lambda</a:t>
             </a:r>
-            <a:endParaRPr lang="en-AU" dirty="0" smtClean="0"/>
           </a:p>
           <a:p>
             <a:pPr marL="571500" indent="-571500">
@@ -18382,14 +18803,7 @@
                 <a:latin typeface="Segoe UI Light" pitchFamily="34" charset="0"/>
                 <a:cs typeface="Segoe UI Light" pitchFamily="34" charset="0"/>
               </a:rPr>
-              <a:t>		</a:t>
-            </a:r>
-            <a:r>
-              <a:rPr lang="en-AU" sz="2000" dirty="0" smtClean="0">
-                <a:latin typeface="Segoe UI Light" pitchFamily="34" charset="0"/>
-                <a:cs typeface="Segoe UI Light" pitchFamily="34" charset="0"/>
-              </a:rPr>
-              <a:t>.where(function(x) { “x =&gt; x % 2 === 0”);</a:t>
+              <a:t>		.where(function(x) { “x =&gt; x % 2 === 0”);</a:t>
             </a:r>
           </a:p>
           <a:p>
@@ -18663,13 +19077,13 @@
   <p:clrMapOvr>
     <a:masterClrMapping/>
   </p:clrMapOvr>
-  <mc:AlternateContent xmlns:mc="http://schemas.openxmlformats.org/markup-compatibility/2006">
-    <mc:Choice xmlns:p14="http://schemas.microsoft.com/office/powerpoint/2010/main" Requires="p14">
+  <mc:AlternateContent xmlns:mc="http://schemas.openxmlformats.org/markup-compatibility/2006" xmlns:p14="http://schemas.microsoft.com/office/powerpoint/2010/main">
+    <mc:Choice Requires="p14">
       <p:transition spd="med" p14:dur="700">
         <p:fade/>
       </p:transition>
     </mc:Choice>
-    <mc:Fallback>
+    <mc:Fallback xmlns="">
       <p:transition spd="med">
         <p:fade/>
       </p:transition>
@@ -18774,11 +19188,7 @@
           <a:p>
             <a:r>
               <a:rPr lang="en-AU" sz="2400" dirty="0" smtClean="0"/>
-              <a:t>http</a:t>
-            </a:r>
-            <a:r>
-              <a:rPr lang="en-AU" sz="2400" dirty="0" smtClean="0"/>
-              <a:t>://linqjs.codeplex.com</a:t>
+              <a:t>http://linqjs.codeplex.com</a:t>
             </a:r>
             <a:endParaRPr lang="en-GB" sz="2400" dirty="0"/>
           </a:p>
@@ -18803,7 +19213,6 @@
               <a:rPr lang="en-AU" dirty="0" smtClean="0"/>
               <a:t>Filter with lambda shortcut</a:t>
             </a:r>
-            <a:endParaRPr lang="en-AU" dirty="0" smtClean="0"/>
           </a:p>
           <a:p>
             <a:pPr marL="571500" indent="-571500">
@@ -19128,14 +19537,7 @@
                 <a:latin typeface="Segoe UI Light" pitchFamily="34" charset="0"/>
                 <a:cs typeface="Segoe UI Light" pitchFamily="34" charset="0"/>
               </a:rPr>
-              <a:t>		</a:t>
-            </a:r>
-            <a:r>
-              <a:rPr lang="en-AU" sz="2000" dirty="0" smtClean="0">
-                <a:latin typeface="Segoe UI Light" pitchFamily="34" charset="0"/>
-                <a:cs typeface="Segoe UI Light" pitchFamily="34" charset="0"/>
-              </a:rPr>
-              <a:t>.where(function(x) { “$ % 2 === 0”);</a:t>
+              <a:t>		.where(function(x) { “$ % 2 === 0”);</a:t>
             </a:r>
           </a:p>
           <a:p>
@@ -19409,13 +19811,13 @@
   <p:clrMapOvr>
     <a:masterClrMapping/>
   </p:clrMapOvr>
-  <mc:AlternateContent xmlns:mc="http://schemas.openxmlformats.org/markup-compatibility/2006">
-    <mc:Choice xmlns:p14="http://schemas.microsoft.com/office/powerpoint/2010/main" Requires="p14">
+  <mc:AlternateContent xmlns:mc="http://schemas.openxmlformats.org/markup-compatibility/2006" xmlns:p14="http://schemas.microsoft.com/office/powerpoint/2010/main">
+    <mc:Choice Requires="p14">
       <p:transition spd="med" p14:dur="700">
         <p:fade/>
       </p:transition>
     </mc:Choice>
-    <mc:Fallback>
+    <mc:Fallback xmlns="">
       <p:transition spd="med">
         <p:fade/>
       </p:transition>
@@ -19450,7 +19852,7 @@
       </p:grpSpPr>
       <p:sp>
         <p:nvSpPr>
-          <p:cNvPr id="2" name="Title 1"/>
+          <p:cNvPr id="8" name="Title 7"/>
           <p:cNvSpPr>
             <a:spLocks noGrp="1"/>
           </p:cNvSpPr>
@@ -19463,18 +19865,569 @@
           <a:bodyPr/>
           <a:lstStyle/>
           <a:p>
+            <a:pPr algn="l"/>
             <a:r>
               <a:rPr lang="en-US" dirty="0" smtClean="0"/>
-              <a:t>Demo</a:t>
+              <a:t>linq.js</a:t>
             </a:r>
             <a:endParaRPr lang="hr-HR" dirty="0"/>
+          </a:p>
+        </p:txBody>
+      </p:sp>
+      <p:sp>
+        <p:nvSpPr>
+          <p:cNvPr id="12" name="Content Placeholder 2"/>
+          <p:cNvSpPr>
+            <a:spLocks noGrp="1"/>
+          </p:cNvSpPr>
+          <p:nvPr>
+            <p:ph idx="10"/>
+          </p:nvPr>
+        </p:nvSpPr>
+        <p:spPr>
+          <a:solidFill>
+            <a:srgbClr val="60A917"/>
+          </a:solidFill>
+        </p:spPr>
+        <p:txBody>
+          <a:bodyPr anchor="b"/>
+          <a:lstStyle/>
+          <a:p>
+            <a:r>
+              <a:rPr lang="en-GB" dirty="0" smtClean="0"/>
+              <a:t>linq.js</a:t>
+            </a:r>
+            <a:endParaRPr lang="en-GB" dirty="0"/>
+          </a:p>
+        </p:txBody>
+      </p:sp>
+      <p:sp>
+        <p:nvSpPr>
+          <p:cNvPr id="13" name="Content Placeholder 2"/>
+          <p:cNvSpPr>
+            <a:spLocks noGrp="1"/>
+          </p:cNvSpPr>
+          <p:nvPr>
+            <p:ph idx="11"/>
+          </p:nvPr>
+        </p:nvSpPr>
+        <p:spPr>
+          <a:solidFill>
+            <a:srgbClr val="60A917"/>
+          </a:solidFill>
+        </p:spPr>
+        <p:txBody>
+          <a:bodyPr anchor="b"/>
+          <a:lstStyle/>
+          <a:p>
+            <a:r>
+              <a:rPr lang="en-AU" sz="2400" dirty="0" smtClean="0"/>
+              <a:t>http://linqjs.codeplex.com</a:t>
+            </a:r>
+            <a:endParaRPr lang="en-GB" sz="2400" dirty="0"/>
+          </a:p>
+        </p:txBody>
+      </p:sp>
+      <p:sp>
+        <p:nvSpPr>
+          <p:cNvPr id="9" name="Content Placeholder 8"/>
+          <p:cNvSpPr>
+            <a:spLocks noGrp="1"/>
+          </p:cNvSpPr>
+          <p:nvPr>
+            <p:ph idx="1"/>
+          </p:nvPr>
+        </p:nvSpPr>
+        <p:spPr/>
+        <p:txBody>
+          <a:bodyPr/>
+          <a:lstStyle/>
+          <a:p>
+            <a:r>
+              <a:rPr lang="en-AU" dirty="0" smtClean="0"/>
+              <a:t>Working with </a:t>
+            </a:r>
+            <a:r>
+              <a:rPr lang="en-AU" dirty="0" err="1" smtClean="0"/>
+              <a:t>jQuery</a:t>
+            </a:r>
+            <a:r>
+              <a:rPr lang="en-AU" dirty="0" smtClean="0"/>
+              <a:t> elements</a:t>
+            </a:r>
+            <a:endParaRPr lang="en-AU" dirty="0" smtClean="0"/>
+          </a:p>
+          <a:p>
+            <a:pPr marL="571500" indent="-571500">
+              <a:buFontTx/>
+              <a:buChar char="-"/>
+            </a:pPr>
+            <a:endParaRPr lang="hr-HR" dirty="0"/>
+          </a:p>
+        </p:txBody>
+      </p:sp>
+      <p:sp>
+        <p:nvSpPr>
+          <p:cNvPr id="6" name="Content Placeholder 2"/>
+          <p:cNvSpPr txBox="1">
+            <a:spLocks/>
+          </p:cNvSpPr>
+          <p:nvPr/>
+        </p:nvSpPr>
+        <p:spPr>
+          <a:xfrm flipH="1">
+            <a:off x="881443" y="2461735"/>
+            <a:ext cx="7774813" cy="4037781"/>
+          </a:xfrm>
+          <a:prstGeom prst="rect">
+            <a:avLst/>
+          </a:prstGeom>
+          <a:solidFill>
+            <a:schemeClr val="tx1">
+              <a:alpha val="10000"/>
+            </a:schemeClr>
+          </a:solidFill>
+        </p:spPr>
+        <p:txBody>
+          <a:bodyPr lIns="97566" tIns="48783" rIns="97566" bIns="48783" anchor="b"/>
+          <a:lstStyle>
+            <a:lvl1pPr marL="0" indent="0" algn="l" defTabSz="580735" rtl="0" eaLnBrk="1" latinLnBrk="0" hangingPunct="1">
+              <a:spcBef>
+                <a:spcPct val="20000"/>
+              </a:spcBef>
+              <a:buClr>
+                <a:schemeClr val="tx1"/>
+              </a:buClr>
+              <a:buFontTx/>
+              <a:buNone/>
+              <a:defRPr sz="3000" kern="1200">
+                <a:solidFill>
+                  <a:schemeClr val="tx1"/>
+                </a:solidFill>
+                <a:latin typeface="Segoe UI Light" pitchFamily="34" charset="0"/>
+                <a:ea typeface="+mn-ea"/>
+                <a:cs typeface="+mn-cs"/>
+              </a:defRPr>
+            </a:lvl1pPr>
+            <a:lvl2pPr marL="271285" indent="0" algn="l" defTabSz="580735" rtl="0" eaLnBrk="1" latinLnBrk="0" hangingPunct="1">
+              <a:spcBef>
+                <a:spcPct val="20000"/>
+              </a:spcBef>
+              <a:buClr>
+                <a:schemeClr val="tx1"/>
+              </a:buClr>
+              <a:buFontTx/>
+              <a:buNone/>
+              <a:defRPr sz="3600" kern="1200">
+                <a:solidFill>
+                  <a:schemeClr val="bg1">
+                    <a:lumMod val="75000"/>
+                  </a:schemeClr>
+                </a:solidFill>
+                <a:latin typeface="Segoe UI Light" pitchFamily="34" charset="0"/>
+                <a:ea typeface="+mn-ea"/>
+                <a:cs typeface="+mn-cs"/>
+              </a:defRPr>
+            </a:lvl2pPr>
+            <a:lvl3pPr marL="524324" indent="0" algn="l" defTabSz="580735" rtl="0" eaLnBrk="1" latinLnBrk="0" hangingPunct="1">
+              <a:spcBef>
+                <a:spcPct val="20000"/>
+              </a:spcBef>
+              <a:buClr>
+                <a:schemeClr val="tx1"/>
+              </a:buClr>
+              <a:buFontTx/>
+              <a:buNone/>
+              <a:defRPr sz="3000" kern="1200">
+                <a:solidFill>
+                  <a:schemeClr val="bg1">
+                    <a:lumMod val="50000"/>
+                  </a:schemeClr>
+                </a:solidFill>
+                <a:latin typeface="Segoe UI Light" pitchFamily="34" charset="0"/>
+                <a:ea typeface="+mn-ea"/>
+                <a:cs typeface="+mn-cs"/>
+              </a:defRPr>
+            </a:lvl3pPr>
+            <a:lvl4pPr marL="2032574" indent="-290368" algn="l" defTabSz="580735" rtl="0" eaLnBrk="1" latinLnBrk="0" hangingPunct="1">
+              <a:spcBef>
+                <a:spcPct val="20000"/>
+              </a:spcBef>
+              <a:buFont typeface="Arial"/>
+              <a:buChar char="–"/>
+              <a:defRPr sz="2500" kern="1200">
+                <a:solidFill>
+                  <a:schemeClr val="tx1"/>
+                </a:solidFill>
+                <a:latin typeface="+mn-lt"/>
+                <a:ea typeface="+mn-ea"/>
+                <a:cs typeface="+mn-cs"/>
+              </a:defRPr>
+            </a:lvl4pPr>
+            <a:lvl5pPr marL="2613309" indent="-290368" algn="l" defTabSz="580735" rtl="0" eaLnBrk="1" latinLnBrk="0" hangingPunct="1">
+              <a:spcBef>
+                <a:spcPct val="20000"/>
+              </a:spcBef>
+              <a:buFont typeface="Arial"/>
+              <a:buChar char="»"/>
+              <a:defRPr sz="2500" kern="1200">
+                <a:solidFill>
+                  <a:schemeClr val="tx1"/>
+                </a:solidFill>
+                <a:latin typeface="+mn-lt"/>
+                <a:ea typeface="+mn-ea"/>
+                <a:cs typeface="+mn-cs"/>
+              </a:defRPr>
+            </a:lvl5pPr>
+            <a:lvl6pPr marL="3194045" indent="-290368" algn="l" defTabSz="580735" rtl="0" eaLnBrk="1" latinLnBrk="0" hangingPunct="1">
+              <a:spcBef>
+                <a:spcPct val="20000"/>
+              </a:spcBef>
+              <a:buFont typeface="Arial"/>
+              <a:buChar char="•"/>
+              <a:defRPr sz="2500" kern="1200">
+                <a:solidFill>
+                  <a:schemeClr val="tx1"/>
+                </a:solidFill>
+                <a:latin typeface="+mn-lt"/>
+                <a:ea typeface="+mn-ea"/>
+                <a:cs typeface="+mn-cs"/>
+              </a:defRPr>
+            </a:lvl6pPr>
+            <a:lvl7pPr marL="3774780" indent="-290368" algn="l" defTabSz="580735" rtl="0" eaLnBrk="1" latinLnBrk="0" hangingPunct="1">
+              <a:spcBef>
+                <a:spcPct val="20000"/>
+              </a:spcBef>
+              <a:buFont typeface="Arial"/>
+              <a:buChar char="•"/>
+              <a:defRPr sz="2500" kern="1200">
+                <a:solidFill>
+                  <a:schemeClr val="tx1"/>
+                </a:solidFill>
+                <a:latin typeface="+mn-lt"/>
+                <a:ea typeface="+mn-ea"/>
+                <a:cs typeface="+mn-cs"/>
+              </a:defRPr>
+            </a:lvl7pPr>
+            <a:lvl8pPr marL="4355516" indent="-290368" algn="l" defTabSz="580735" rtl="0" eaLnBrk="1" latinLnBrk="0" hangingPunct="1">
+              <a:spcBef>
+                <a:spcPct val="20000"/>
+              </a:spcBef>
+              <a:buFont typeface="Arial"/>
+              <a:buChar char="•"/>
+              <a:defRPr sz="2500" kern="1200">
+                <a:solidFill>
+                  <a:schemeClr val="tx1"/>
+                </a:solidFill>
+                <a:latin typeface="+mn-lt"/>
+                <a:ea typeface="+mn-ea"/>
+                <a:cs typeface="+mn-cs"/>
+              </a:defRPr>
+            </a:lvl8pPr>
+            <a:lvl9pPr marL="4936251" indent="-290368" algn="l" defTabSz="580735" rtl="0" eaLnBrk="1" latinLnBrk="0" hangingPunct="1">
+              <a:spcBef>
+                <a:spcPct val="20000"/>
+              </a:spcBef>
+              <a:buFont typeface="Arial"/>
+              <a:buChar char="•"/>
+              <a:defRPr sz="2500" kern="1200">
+                <a:solidFill>
+                  <a:schemeClr val="tx1"/>
+                </a:solidFill>
+                <a:latin typeface="+mn-lt"/>
+                <a:ea typeface="+mn-ea"/>
+                <a:cs typeface="+mn-cs"/>
+              </a:defRPr>
+            </a:lvl9pPr>
+          </a:lstStyle>
+          <a:p>
+            <a:endParaRPr lang="en-AU" dirty="0"/>
+          </a:p>
+        </p:txBody>
+      </p:sp>
+      <p:sp>
+        <p:nvSpPr>
+          <p:cNvPr id="7" name="Rectangle 6"/>
+          <p:cNvSpPr/>
+          <p:nvPr/>
+        </p:nvSpPr>
+        <p:spPr>
+          <a:xfrm>
+            <a:off x="1054100" y="2668846"/>
+            <a:ext cx="349250" cy="3594167"/>
+          </a:xfrm>
+          <a:prstGeom prst="rect">
+            <a:avLst/>
+          </a:prstGeom>
+          <a:solidFill>
+            <a:srgbClr val="92D050"/>
+          </a:solidFill>
+          <a:ln>
+            <a:noFill/>
+          </a:ln>
+        </p:spPr>
+        <p:style>
+          <a:lnRef idx="1">
+            <a:schemeClr val="accent1"/>
+          </a:lnRef>
+          <a:fillRef idx="3">
+            <a:schemeClr val="accent1"/>
+          </a:fillRef>
+          <a:effectRef idx="2">
+            <a:schemeClr val="accent1"/>
+          </a:effectRef>
+          <a:fontRef idx="minor">
+            <a:schemeClr val="lt1"/>
+          </a:fontRef>
+        </p:style>
+        <p:txBody>
+          <a:bodyPr rtlCol="0" anchor="ctr"/>
+          <a:lstStyle/>
+          <a:p>
+            <a:pPr algn="ctr"/>
+            <a:endParaRPr lang="en-AU"/>
+          </a:p>
+        </p:txBody>
+      </p:sp>
+      <p:sp>
+        <p:nvSpPr>
+          <p:cNvPr id="14" name="TextBox 13"/>
+          <p:cNvSpPr txBox="1"/>
+          <p:nvPr/>
+        </p:nvSpPr>
+        <p:spPr>
+          <a:xfrm>
+            <a:off x="1446588" y="2668847"/>
+            <a:ext cx="6731000" cy="2862322"/>
+          </a:xfrm>
+          <a:prstGeom prst="rect">
+            <a:avLst/>
+          </a:prstGeom>
+          <a:noFill/>
+        </p:spPr>
+        <p:txBody>
+          <a:bodyPr wrap="square" rtlCol="0">
+            <a:spAutoFit/>
+          </a:bodyPr>
+          <a:lstStyle/>
+          <a:p>
+            <a:r>
+              <a:rPr lang="en-AU" sz="2000" dirty="0" smtClean="0">
+                <a:latin typeface="Segoe UI Light" pitchFamily="34" charset="0"/>
+                <a:cs typeface="Segoe UI Light" pitchFamily="34" charset="0"/>
+              </a:rPr>
+              <a:t>&lt;table id=“</a:t>
+            </a:r>
+            <a:r>
+              <a:rPr lang="en-AU" sz="2000" dirty="0" err="1" smtClean="0">
+                <a:latin typeface="Segoe UI Light" pitchFamily="34" charset="0"/>
+                <a:cs typeface="Segoe UI Light" pitchFamily="34" charset="0"/>
+              </a:rPr>
+              <a:t>testTable</a:t>
+            </a:r>
+            <a:r>
+              <a:rPr lang="en-AU" sz="2000" dirty="0" smtClean="0">
+                <a:latin typeface="Segoe UI Light" pitchFamily="34" charset="0"/>
+                <a:cs typeface="Segoe UI Light" pitchFamily="34" charset="0"/>
+              </a:rPr>
+              <a:t>”&gt;</a:t>
+            </a:r>
+          </a:p>
+          <a:p>
+            <a:r>
+              <a:rPr lang="en-AU" sz="2000" dirty="0">
+                <a:latin typeface="Segoe UI Light" pitchFamily="34" charset="0"/>
+                <a:cs typeface="Segoe UI Light" pitchFamily="34" charset="0"/>
+              </a:rPr>
+              <a:t>	</a:t>
+            </a:r>
+            <a:r>
+              <a:rPr lang="en-AU" sz="2000" dirty="0" smtClean="0">
+                <a:latin typeface="Segoe UI Light" pitchFamily="34" charset="0"/>
+                <a:cs typeface="Segoe UI Light" pitchFamily="34" charset="0"/>
+              </a:rPr>
+              <a:t>&lt;</a:t>
+            </a:r>
+            <a:r>
+              <a:rPr lang="en-AU" sz="2000" dirty="0" err="1" smtClean="0">
+                <a:latin typeface="Segoe UI Light" pitchFamily="34" charset="0"/>
+                <a:cs typeface="Segoe UI Light" pitchFamily="34" charset="0"/>
+              </a:rPr>
+              <a:t>tr</a:t>
+            </a:r>
+            <a:r>
+              <a:rPr lang="en-AU" sz="2000" dirty="0" smtClean="0">
+                <a:latin typeface="Segoe UI Light" pitchFamily="34" charset="0"/>
+                <a:cs typeface="Segoe UI Light" pitchFamily="34" charset="0"/>
+              </a:rPr>
+              <a:t>&gt;</a:t>
+            </a:r>
+          </a:p>
+          <a:p>
+            <a:r>
+              <a:rPr lang="en-AU" sz="2000" dirty="0">
+                <a:latin typeface="Segoe UI Light" pitchFamily="34" charset="0"/>
+                <a:cs typeface="Segoe UI Light" pitchFamily="34" charset="0"/>
+              </a:rPr>
+              <a:t>	</a:t>
+            </a:r>
+            <a:r>
+              <a:rPr lang="en-AU" sz="2000" dirty="0" smtClean="0">
+                <a:latin typeface="Segoe UI Light" pitchFamily="34" charset="0"/>
+                <a:cs typeface="Segoe UI Light" pitchFamily="34" charset="0"/>
+              </a:rPr>
+              <a:t>	&lt;td class=“foo”&gt;Bar&lt;/td&gt;</a:t>
+            </a:r>
+          </a:p>
+          <a:p>
+            <a:r>
+              <a:rPr lang="en-AU" sz="2000" dirty="0">
+                <a:latin typeface="Segoe UI Light" pitchFamily="34" charset="0"/>
+                <a:cs typeface="Segoe UI Light" pitchFamily="34" charset="0"/>
+              </a:rPr>
+              <a:t>	</a:t>
+            </a:r>
+            <a:r>
+              <a:rPr lang="en-AU" sz="2000" dirty="0" smtClean="0">
+                <a:latin typeface="Segoe UI Light" pitchFamily="34" charset="0"/>
+                <a:cs typeface="Segoe UI Light" pitchFamily="34" charset="0"/>
+              </a:rPr>
+              <a:t>&lt;/</a:t>
+            </a:r>
+            <a:r>
+              <a:rPr lang="en-AU" sz="2000" dirty="0" err="1" smtClean="0">
+                <a:latin typeface="Segoe UI Light" pitchFamily="34" charset="0"/>
+                <a:cs typeface="Segoe UI Light" pitchFamily="34" charset="0"/>
+              </a:rPr>
+              <a:t>tr</a:t>
+            </a:r>
+            <a:r>
+              <a:rPr lang="en-AU" sz="2000" dirty="0" smtClean="0">
+                <a:latin typeface="Segoe UI Light" pitchFamily="34" charset="0"/>
+                <a:cs typeface="Segoe UI Light" pitchFamily="34" charset="0"/>
+              </a:rPr>
+              <a:t>&gt;</a:t>
+            </a:r>
+          </a:p>
+          <a:p>
+            <a:r>
+              <a:rPr lang="en-AU" sz="2000" dirty="0">
+                <a:latin typeface="Segoe UI Light" pitchFamily="34" charset="0"/>
+                <a:cs typeface="Segoe UI Light" pitchFamily="34" charset="0"/>
+              </a:rPr>
+              <a:t>	</a:t>
+            </a:r>
+            <a:r>
+              <a:rPr lang="en-AU" sz="2000" dirty="0" smtClean="0">
+                <a:latin typeface="Segoe UI Light" pitchFamily="34" charset="0"/>
+                <a:cs typeface="Segoe UI Light" pitchFamily="34" charset="0"/>
+              </a:rPr>
+              <a:t>&lt;</a:t>
+            </a:r>
+            <a:r>
+              <a:rPr lang="en-AU" sz="2000" dirty="0" err="1" smtClean="0">
+                <a:latin typeface="Segoe UI Light" pitchFamily="34" charset="0"/>
+                <a:cs typeface="Segoe UI Light" pitchFamily="34" charset="0"/>
+              </a:rPr>
+              <a:t>tr</a:t>
+            </a:r>
+            <a:r>
+              <a:rPr lang="en-AU" sz="2000" dirty="0" smtClean="0">
+                <a:latin typeface="Segoe UI Light" pitchFamily="34" charset="0"/>
+                <a:cs typeface="Segoe UI Light" pitchFamily="34" charset="0"/>
+              </a:rPr>
+              <a:t>&gt;</a:t>
+            </a:r>
+          </a:p>
+          <a:p>
+            <a:r>
+              <a:rPr lang="en-AU" sz="2000" dirty="0">
+                <a:latin typeface="Segoe UI Light" pitchFamily="34" charset="0"/>
+                <a:cs typeface="Segoe UI Light" pitchFamily="34" charset="0"/>
+              </a:rPr>
+              <a:t>	</a:t>
+            </a:r>
+            <a:r>
+              <a:rPr lang="en-AU" sz="2000" dirty="0" smtClean="0">
+                <a:latin typeface="Segoe UI Light" pitchFamily="34" charset="0"/>
+                <a:cs typeface="Segoe UI Light" pitchFamily="34" charset="0"/>
+              </a:rPr>
+              <a:t>	&lt;td class=“foo”&gt;</a:t>
+            </a:r>
+            <a:r>
+              <a:rPr lang="en-AU" sz="2000" dirty="0" err="1" smtClean="0">
+                <a:latin typeface="Segoe UI Light" pitchFamily="34" charset="0"/>
+                <a:cs typeface="Segoe UI Light" pitchFamily="34" charset="0"/>
+              </a:rPr>
+              <a:t>Bloo</a:t>
+            </a:r>
+            <a:r>
+              <a:rPr lang="en-AU" sz="2000" dirty="0" smtClean="0">
+                <a:latin typeface="Segoe UI Light" pitchFamily="34" charset="0"/>
+                <a:cs typeface="Segoe UI Light" pitchFamily="34" charset="0"/>
+              </a:rPr>
+              <a:t>&lt;/td&gt;</a:t>
+            </a:r>
+          </a:p>
+          <a:p>
+            <a:r>
+              <a:rPr lang="en-AU" sz="2000" dirty="0">
+                <a:latin typeface="Segoe UI Light" pitchFamily="34" charset="0"/>
+                <a:cs typeface="Segoe UI Light" pitchFamily="34" charset="0"/>
+              </a:rPr>
+              <a:t>	</a:t>
+            </a:r>
+            <a:r>
+              <a:rPr lang="en-AU" sz="2000" dirty="0" smtClean="0">
+                <a:latin typeface="Segoe UI Light" pitchFamily="34" charset="0"/>
+                <a:cs typeface="Segoe UI Light" pitchFamily="34" charset="0"/>
+              </a:rPr>
+              <a:t>&lt;/</a:t>
+            </a:r>
+            <a:r>
+              <a:rPr lang="en-AU" sz="2000" dirty="0" err="1" smtClean="0">
+                <a:latin typeface="Segoe UI Light" pitchFamily="34" charset="0"/>
+                <a:cs typeface="Segoe UI Light" pitchFamily="34" charset="0"/>
+              </a:rPr>
+              <a:t>tr</a:t>
+            </a:r>
+            <a:r>
+              <a:rPr lang="en-AU" sz="2000" dirty="0" smtClean="0">
+                <a:latin typeface="Segoe UI Light" pitchFamily="34" charset="0"/>
+                <a:cs typeface="Segoe UI Light" pitchFamily="34" charset="0"/>
+              </a:rPr>
+              <a:t>&gt;</a:t>
+            </a:r>
+            <a:endParaRPr lang="en-AU" sz="2000" dirty="0" smtClean="0">
+              <a:latin typeface="Segoe UI Light" pitchFamily="34" charset="0"/>
+              <a:cs typeface="Segoe UI Light" pitchFamily="34" charset="0"/>
+            </a:endParaRPr>
+          </a:p>
+          <a:p>
+            <a:r>
+              <a:rPr lang="en-AU" sz="2000" dirty="0" smtClean="0">
+                <a:latin typeface="Segoe UI Light" pitchFamily="34" charset="0"/>
+                <a:cs typeface="Segoe UI Light" pitchFamily="34" charset="0"/>
+              </a:rPr>
+              <a:t>&lt;/table&gt;</a:t>
+            </a:r>
+            <a:endParaRPr lang="en-AU" sz="2000" dirty="0">
+              <a:latin typeface="Segoe UI Light" pitchFamily="34" charset="0"/>
+              <a:cs typeface="Segoe UI Light" pitchFamily="34" charset="0"/>
+            </a:endParaRPr>
+          </a:p>
+          <a:p>
+            <a:endParaRPr lang="en-AU" sz="2000" dirty="0">
+              <a:latin typeface="Segoe UI Light" pitchFamily="34" charset="0"/>
+              <a:cs typeface="Segoe UI Light" pitchFamily="34" charset="0"/>
+            </a:endParaRPr>
           </a:p>
         </p:txBody>
       </p:sp>
     </p:spTree>
     <p:extLst>
       <p:ext uri="{BB962C8B-B14F-4D97-AF65-F5344CB8AC3E}">
-        <p14:creationId xmlns:p14="http://schemas.microsoft.com/office/powerpoint/2010/main" val="3997771631"/>
+        <p14:creationId xmlns:p14="http://schemas.microsoft.com/office/powerpoint/2010/main" val="3756730900"/>
       </p:ext>
     </p:extLst>
   </p:cSld>
@@ -19483,12 +20436,12 @@
   </p:clrMapOvr>
   <mc:AlternateContent xmlns:mc="http://schemas.openxmlformats.org/markup-compatibility/2006" xmlns:p14="http://schemas.microsoft.com/office/powerpoint/2010/main">
     <mc:Choice Requires="p14">
-      <p:transition spd="med" p14:dur="700" advClick="0" advTm="1000">
+      <p:transition spd="med" p14:dur="700">
         <p:fade/>
       </p:transition>
     </mc:Choice>
     <mc:Fallback xmlns="">
-      <p:transition spd="med" advClick="0" advTm="1000">
+      <p:transition spd="med">
         <p:fade/>
       </p:transition>
     </mc:Fallback>
@@ -19522,7 +20475,7 @@
       </p:grpSpPr>
       <p:sp>
         <p:nvSpPr>
-          <p:cNvPr id="2" name="Title 1"/>
+          <p:cNvPr id="8" name="Title 7"/>
           <p:cNvSpPr>
             <a:spLocks noGrp="1"/>
           </p:cNvSpPr>
@@ -19535,69 +20488,340 @@
           <a:bodyPr/>
           <a:lstStyle/>
           <a:p>
+            <a:pPr algn="l"/>
             <a:r>
               <a:rPr lang="en-US" dirty="0" smtClean="0"/>
-              <a:t>Ideas for next month?</a:t>
+              <a:t>linq.js</a:t>
             </a:r>
             <a:endParaRPr lang="hr-HR" dirty="0"/>
           </a:p>
         </p:txBody>
       </p:sp>
-      <p:pic>
-        <p:nvPicPr>
-          <p:cNvPr id="4" name="Picture 2" descr="C:\Users\t-dantay\Documents\Placeholders\home.png"/>
-          <p:cNvPicPr>
-            <a:picLocks noChangeAspect="1" noChangeArrowheads="1"/>
-          </p:cNvPicPr>
+      <p:sp>
+        <p:nvSpPr>
+          <p:cNvPr id="12" name="Content Placeholder 2"/>
+          <p:cNvSpPr>
+            <a:spLocks noGrp="1"/>
+          </p:cNvSpPr>
           <p:nvPr>
-            <p:custDataLst>
-              <p:custData r:id="rId1"/>
-            </p:custDataLst>
+            <p:ph idx="10"/>
           </p:nvPr>
-        </p:nvPicPr>
-        <p:blipFill>
-          <a:blip r:embed="rId3" cstate="print">
-            <a:extLst>
-              <a:ext uri="{28A0092B-C50C-407E-A947-70E740481C1C}">
-                <a14:useLocalDpi xmlns:a14="http://schemas.microsoft.com/office/drawing/2010/main" val="0"/>
-              </a:ext>
-            </a:extLst>
-          </a:blip>
-          <a:srcRect/>
-          <a:stretch>
-            <a:fillRect/>
-          </a:stretch>
-        </p:blipFill>
-        <p:spPr bwMode="auto">
-          <a:xfrm>
-            <a:off x="2980071" y="5203329"/>
-            <a:ext cx="888396" cy="874514"/>
+        </p:nvSpPr>
+        <p:spPr>
+          <a:solidFill>
+            <a:srgbClr val="60A917"/>
+          </a:solidFill>
+        </p:spPr>
+        <p:txBody>
+          <a:bodyPr anchor="b"/>
+          <a:lstStyle/>
+          <a:p>
+            <a:r>
+              <a:rPr lang="en-GB" dirty="0" smtClean="0"/>
+              <a:t>linq.js</a:t>
+            </a:r>
+            <a:endParaRPr lang="en-GB" dirty="0"/>
+          </a:p>
+        </p:txBody>
+      </p:sp>
+      <p:sp>
+        <p:nvSpPr>
+          <p:cNvPr id="13" name="Content Placeholder 2"/>
+          <p:cNvSpPr>
+            <a:spLocks noGrp="1"/>
+          </p:cNvSpPr>
+          <p:nvPr>
+            <p:ph idx="11"/>
+          </p:nvPr>
+        </p:nvSpPr>
+        <p:spPr>
+          <a:solidFill>
+            <a:srgbClr val="60A917"/>
+          </a:solidFill>
+        </p:spPr>
+        <p:txBody>
+          <a:bodyPr anchor="b"/>
+          <a:lstStyle/>
+          <a:p>
+            <a:r>
+              <a:rPr lang="en-AU" sz="2400" dirty="0" smtClean="0"/>
+              <a:t>http://linqjs.codeplex.com</a:t>
+            </a:r>
+            <a:endParaRPr lang="en-GB" sz="2400" dirty="0"/>
+          </a:p>
+        </p:txBody>
+      </p:sp>
+      <p:sp>
+        <p:nvSpPr>
+          <p:cNvPr id="9" name="Content Placeholder 8"/>
+          <p:cNvSpPr>
+            <a:spLocks noGrp="1"/>
+          </p:cNvSpPr>
+          <p:nvPr>
+            <p:ph idx="1"/>
+          </p:nvPr>
+        </p:nvSpPr>
+        <p:spPr/>
+        <p:txBody>
+          <a:bodyPr/>
+          <a:lstStyle/>
+          <a:p>
+            <a:r>
+              <a:rPr lang="en-AU" dirty="0" smtClean="0"/>
+              <a:t>Working with </a:t>
+            </a:r>
+            <a:r>
+              <a:rPr lang="en-AU" dirty="0" err="1" smtClean="0"/>
+              <a:t>jQuery</a:t>
+            </a:r>
+            <a:r>
+              <a:rPr lang="en-AU" dirty="0" smtClean="0"/>
+              <a:t> elements</a:t>
+            </a:r>
+            <a:endParaRPr lang="en-AU" dirty="0" smtClean="0"/>
+          </a:p>
+          <a:p>
+            <a:pPr marL="571500" indent="-571500">
+              <a:buFontTx/>
+              <a:buChar char="-"/>
+            </a:pPr>
+            <a:endParaRPr lang="hr-HR" dirty="0"/>
+          </a:p>
+        </p:txBody>
+      </p:sp>
+      <p:sp>
+        <p:nvSpPr>
+          <p:cNvPr id="6" name="Content Placeholder 2"/>
+          <p:cNvSpPr txBox="1">
+            <a:spLocks/>
+          </p:cNvSpPr>
+          <p:nvPr/>
+        </p:nvSpPr>
+        <p:spPr>
+          <a:xfrm flipH="1">
+            <a:off x="881443" y="2461735"/>
+            <a:ext cx="7774813" cy="4037781"/>
           </a:xfrm>
           <a:prstGeom prst="rect">
             <a:avLst/>
           </a:prstGeom>
-          <a:noFill/>
-          <a:extLst>
-            <a:ext uri="{909E8E84-426E-40DD-AFC4-6F175D3DCCD1}">
-              <a14:hiddenFill xmlns:a14="http://schemas.microsoft.com/office/drawing/2010/main">
+          <a:solidFill>
+            <a:schemeClr val="tx1">
+              <a:alpha val="10000"/>
+            </a:schemeClr>
+          </a:solidFill>
+        </p:spPr>
+        <p:txBody>
+          <a:bodyPr lIns="97566" tIns="48783" rIns="97566" bIns="48783" anchor="b"/>
+          <a:lstStyle>
+            <a:lvl1pPr marL="0" indent="0" algn="l" defTabSz="580735" rtl="0" eaLnBrk="1" latinLnBrk="0" hangingPunct="1">
+              <a:spcBef>
+                <a:spcPct val="20000"/>
+              </a:spcBef>
+              <a:buClr>
+                <a:schemeClr val="tx1"/>
+              </a:buClr>
+              <a:buFontTx/>
+              <a:buNone/>
+              <a:defRPr sz="3000" kern="1200">
                 <a:solidFill>
-                  <a:srgbClr val="FFFFFF"/>
+                  <a:schemeClr val="tx1"/>
                 </a:solidFill>
-              </a14:hiddenFill>
-            </a:ext>
-          </a:extLst>
-        </p:spPr>
-      </p:pic>
+                <a:latin typeface="Segoe UI Light" pitchFamily="34" charset="0"/>
+                <a:ea typeface="+mn-ea"/>
+                <a:cs typeface="+mn-cs"/>
+              </a:defRPr>
+            </a:lvl1pPr>
+            <a:lvl2pPr marL="271285" indent="0" algn="l" defTabSz="580735" rtl="0" eaLnBrk="1" latinLnBrk="0" hangingPunct="1">
+              <a:spcBef>
+                <a:spcPct val="20000"/>
+              </a:spcBef>
+              <a:buClr>
+                <a:schemeClr val="tx1"/>
+              </a:buClr>
+              <a:buFontTx/>
+              <a:buNone/>
+              <a:defRPr sz="3600" kern="1200">
+                <a:solidFill>
+                  <a:schemeClr val="bg1">
+                    <a:lumMod val="75000"/>
+                  </a:schemeClr>
+                </a:solidFill>
+                <a:latin typeface="Segoe UI Light" pitchFamily="34" charset="0"/>
+                <a:ea typeface="+mn-ea"/>
+                <a:cs typeface="+mn-cs"/>
+              </a:defRPr>
+            </a:lvl2pPr>
+            <a:lvl3pPr marL="524324" indent="0" algn="l" defTabSz="580735" rtl="0" eaLnBrk="1" latinLnBrk="0" hangingPunct="1">
+              <a:spcBef>
+                <a:spcPct val="20000"/>
+              </a:spcBef>
+              <a:buClr>
+                <a:schemeClr val="tx1"/>
+              </a:buClr>
+              <a:buFontTx/>
+              <a:buNone/>
+              <a:defRPr sz="3000" kern="1200">
+                <a:solidFill>
+                  <a:schemeClr val="bg1">
+                    <a:lumMod val="50000"/>
+                  </a:schemeClr>
+                </a:solidFill>
+                <a:latin typeface="Segoe UI Light" pitchFamily="34" charset="0"/>
+                <a:ea typeface="+mn-ea"/>
+                <a:cs typeface="+mn-cs"/>
+              </a:defRPr>
+            </a:lvl3pPr>
+            <a:lvl4pPr marL="2032574" indent="-290368" algn="l" defTabSz="580735" rtl="0" eaLnBrk="1" latinLnBrk="0" hangingPunct="1">
+              <a:spcBef>
+                <a:spcPct val="20000"/>
+              </a:spcBef>
+              <a:buFont typeface="Arial"/>
+              <a:buChar char="–"/>
+              <a:defRPr sz="2500" kern="1200">
+                <a:solidFill>
+                  <a:schemeClr val="tx1"/>
+                </a:solidFill>
+                <a:latin typeface="+mn-lt"/>
+                <a:ea typeface="+mn-ea"/>
+                <a:cs typeface="+mn-cs"/>
+              </a:defRPr>
+            </a:lvl4pPr>
+            <a:lvl5pPr marL="2613309" indent="-290368" algn="l" defTabSz="580735" rtl="0" eaLnBrk="1" latinLnBrk="0" hangingPunct="1">
+              <a:spcBef>
+                <a:spcPct val="20000"/>
+              </a:spcBef>
+              <a:buFont typeface="Arial"/>
+              <a:buChar char="»"/>
+              <a:defRPr sz="2500" kern="1200">
+                <a:solidFill>
+                  <a:schemeClr val="tx1"/>
+                </a:solidFill>
+                <a:latin typeface="+mn-lt"/>
+                <a:ea typeface="+mn-ea"/>
+                <a:cs typeface="+mn-cs"/>
+              </a:defRPr>
+            </a:lvl5pPr>
+            <a:lvl6pPr marL="3194045" indent="-290368" algn="l" defTabSz="580735" rtl="0" eaLnBrk="1" latinLnBrk="0" hangingPunct="1">
+              <a:spcBef>
+                <a:spcPct val="20000"/>
+              </a:spcBef>
+              <a:buFont typeface="Arial"/>
+              <a:buChar char="•"/>
+              <a:defRPr sz="2500" kern="1200">
+                <a:solidFill>
+                  <a:schemeClr val="tx1"/>
+                </a:solidFill>
+                <a:latin typeface="+mn-lt"/>
+                <a:ea typeface="+mn-ea"/>
+                <a:cs typeface="+mn-cs"/>
+              </a:defRPr>
+            </a:lvl6pPr>
+            <a:lvl7pPr marL="3774780" indent="-290368" algn="l" defTabSz="580735" rtl="0" eaLnBrk="1" latinLnBrk="0" hangingPunct="1">
+              <a:spcBef>
+                <a:spcPct val="20000"/>
+              </a:spcBef>
+              <a:buFont typeface="Arial"/>
+              <a:buChar char="•"/>
+              <a:defRPr sz="2500" kern="1200">
+                <a:solidFill>
+                  <a:schemeClr val="tx1"/>
+                </a:solidFill>
+                <a:latin typeface="+mn-lt"/>
+                <a:ea typeface="+mn-ea"/>
+                <a:cs typeface="+mn-cs"/>
+              </a:defRPr>
+            </a:lvl7pPr>
+            <a:lvl8pPr marL="4355516" indent="-290368" algn="l" defTabSz="580735" rtl="0" eaLnBrk="1" latinLnBrk="0" hangingPunct="1">
+              <a:spcBef>
+                <a:spcPct val="20000"/>
+              </a:spcBef>
+              <a:buFont typeface="Arial"/>
+              <a:buChar char="•"/>
+              <a:defRPr sz="2500" kern="1200">
+                <a:solidFill>
+                  <a:schemeClr val="tx1"/>
+                </a:solidFill>
+                <a:latin typeface="+mn-lt"/>
+                <a:ea typeface="+mn-ea"/>
+                <a:cs typeface="+mn-cs"/>
+              </a:defRPr>
+            </a:lvl8pPr>
+            <a:lvl9pPr marL="4936251" indent="-290368" algn="l" defTabSz="580735" rtl="0" eaLnBrk="1" latinLnBrk="0" hangingPunct="1">
+              <a:spcBef>
+                <a:spcPct val="20000"/>
+              </a:spcBef>
+              <a:buFont typeface="Arial"/>
+              <a:buChar char="•"/>
+              <a:defRPr sz="2500" kern="1200">
+                <a:solidFill>
+                  <a:schemeClr val="tx1"/>
+                </a:solidFill>
+                <a:latin typeface="+mn-lt"/>
+                <a:ea typeface="+mn-ea"/>
+                <a:cs typeface="+mn-cs"/>
+              </a:defRPr>
+            </a:lvl9pPr>
+          </a:lstStyle>
+          <a:p>
+            <a:endParaRPr lang="en-AU" dirty="0"/>
+          </a:p>
+        </p:txBody>
+      </p:sp>
       <p:sp>
         <p:nvSpPr>
-          <p:cNvPr id="5" name="TextBox 4"/>
+          <p:cNvPr id="7" name="Rectangle 6"/>
+          <p:cNvSpPr/>
+          <p:nvPr/>
+        </p:nvSpPr>
+        <p:spPr>
+          <a:xfrm>
+            <a:off x="1054100" y="2668846"/>
+            <a:ext cx="349250" cy="3594167"/>
+          </a:xfrm>
+          <a:prstGeom prst="rect">
+            <a:avLst/>
+          </a:prstGeom>
+          <a:solidFill>
+            <a:srgbClr val="92D050"/>
+          </a:solidFill>
+          <a:ln>
+            <a:noFill/>
+          </a:ln>
+        </p:spPr>
+        <p:style>
+          <a:lnRef idx="1">
+            <a:schemeClr val="accent1"/>
+          </a:lnRef>
+          <a:fillRef idx="3">
+            <a:schemeClr val="accent1"/>
+          </a:fillRef>
+          <a:effectRef idx="2">
+            <a:schemeClr val="accent1"/>
+          </a:effectRef>
+          <a:fontRef idx="minor">
+            <a:schemeClr val="lt1"/>
+          </a:fontRef>
+        </p:style>
+        <p:txBody>
+          <a:bodyPr rtlCol="0" anchor="ctr"/>
+          <a:lstStyle/>
+          <a:p>
+            <a:pPr algn="ctr"/>
+            <a:endParaRPr lang="en-AU"/>
+          </a:p>
+        </p:txBody>
+      </p:sp>
+      <p:sp>
+        <p:nvSpPr>
+          <p:cNvPr id="14" name="TextBox 13"/>
           <p:cNvSpPr txBox="1"/>
           <p:nvPr/>
         </p:nvSpPr>
         <p:spPr>
           <a:xfrm>
-            <a:off x="3931967" y="5406530"/>
-            <a:ext cx="7155133" cy="523220"/>
+            <a:off x="1446588" y="2668847"/>
+            <a:ext cx="6731000" cy="2246769"/>
           </a:xfrm>
           <a:prstGeom prst="rect">
             <a:avLst/>
@@ -19611,34 +20835,250 @@
           <a:lstStyle/>
           <a:p>
             <a:r>
-              <a:rPr lang="en-AU" sz="2800" dirty="0" smtClean="0">
+              <a:rPr lang="en-AU" sz="2000" dirty="0" err="1" smtClean="0">
                 <a:latin typeface="Segoe UI Light" pitchFamily="34" charset="0"/>
                 <a:cs typeface="Segoe UI Light" pitchFamily="34" charset="0"/>
               </a:rPr>
-              <a:t>github.com/</a:t>
-            </a:r>
-            <a:r>
-              <a:rPr lang="en-AU" sz="2800" dirty="0" err="1" smtClean="0">
+              <a:t>var</a:t>
+            </a:r>
+            <a:r>
+              <a:rPr lang="en-AU" sz="2000" dirty="0" smtClean="0">
                 <a:latin typeface="Segoe UI Light" pitchFamily="34" charset="0"/>
                 <a:cs typeface="Segoe UI Light" pitchFamily="34" charset="0"/>
               </a:rPr>
-              <a:t>dougrathbone</a:t>
-            </a:r>
-            <a:r>
-              <a:rPr lang="en-AU" sz="2800" dirty="0" smtClean="0">
+              <a:t> </a:t>
+            </a:r>
+            <a:r>
+              <a:rPr lang="en-AU" sz="2000" dirty="0" err="1" smtClean="0">
                 <a:latin typeface="Segoe UI Light" pitchFamily="34" charset="0"/>
                 <a:cs typeface="Segoe UI Light" pitchFamily="34" charset="0"/>
               </a:rPr>
-              <a:t>/</a:t>
-            </a:r>
-            <a:r>
-              <a:rPr lang="en-AU" sz="2800" dirty="0" err="1" smtClean="0">
+              <a:t>rowsEnum</a:t>
+            </a:r>
+            <a:r>
+              <a:rPr lang="en-AU" sz="2000" dirty="0" smtClean="0">
                 <a:latin typeface="Segoe UI Light" pitchFamily="34" charset="0"/>
                 <a:cs typeface="Segoe UI Light" pitchFamily="34" charset="0"/>
               </a:rPr>
-              <a:t>bauerdevsessions</a:t>
-            </a:r>
-            <a:endParaRPr lang="en-AU" sz="2800" dirty="0">
+              <a:t> = $(“#</a:t>
+            </a:r>
+            <a:r>
+              <a:rPr lang="en-AU" sz="2000" dirty="0" err="1" smtClean="0">
+                <a:latin typeface="Segoe UI Light" pitchFamily="34" charset="0"/>
+                <a:cs typeface="Segoe UI Light" pitchFamily="34" charset="0"/>
+              </a:rPr>
+              <a:t>testTable</a:t>
+            </a:r>
+            <a:r>
+              <a:rPr lang="en-AU" sz="2000" dirty="0" smtClean="0">
+                <a:latin typeface="Segoe UI Light" pitchFamily="34" charset="0"/>
+                <a:cs typeface="Segoe UI Light" pitchFamily="34" charset="0"/>
+              </a:rPr>
+              <a:t> </a:t>
+            </a:r>
+            <a:r>
+              <a:rPr lang="en-AU" sz="2000" dirty="0" err="1" smtClean="0">
+                <a:latin typeface="Segoe UI Light" pitchFamily="34" charset="0"/>
+                <a:cs typeface="Segoe UI Light" pitchFamily="34" charset="0"/>
+              </a:rPr>
+              <a:t>tr</a:t>
+            </a:r>
+            <a:r>
+              <a:rPr lang="en-AU" sz="2000" dirty="0" smtClean="0">
+                <a:latin typeface="Segoe UI Light" pitchFamily="34" charset="0"/>
+                <a:cs typeface="Segoe UI Light" pitchFamily="34" charset="0"/>
+              </a:rPr>
+              <a:t>”).</a:t>
+            </a:r>
+            <a:r>
+              <a:rPr lang="en-AU" sz="2000" dirty="0" err="1" smtClean="0">
+                <a:latin typeface="Segoe UI Light" pitchFamily="34" charset="0"/>
+                <a:cs typeface="Segoe UI Light" pitchFamily="34" charset="0"/>
+              </a:rPr>
+              <a:t>toEnumerable</a:t>
+            </a:r>
+            <a:r>
+              <a:rPr lang="en-AU" sz="2000" dirty="0" smtClean="0">
+                <a:latin typeface="Segoe UI Light" pitchFamily="34" charset="0"/>
+                <a:cs typeface="Segoe UI Light" pitchFamily="34" charset="0"/>
+              </a:rPr>
+              <a:t>();</a:t>
+            </a:r>
+          </a:p>
+          <a:p>
+            <a:r>
+              <a:rPr lang="en-AU" sz="2000" dirty="0" err="1" smtClean="0">
+                <a:latin typeface="Segoe UI Light" pitchFamily="34" charset="0"/>
+                <a:cs typeface="Segoe UI Light" pitchFamily="34" charset="0"/>
+              </a:rPr>
+              <a:t>var</a:t>
+            </a:r>
+            <a:r>
+              <a:rPr lang="en-AU" sz="2000" dirty="0" smtClean="0">
+                <a:latin typeface="Segoe UI Light" pitchFamily="34" charset="0"/>
+                <a:cs typeface="Segoe UI Light" pitchFamily="34" charset="0"/>
+              </a:rPr>
+              <a:t> </a:t>
+            </a:r>
+            <a:r>
+              <a:rPr lang="en-AU" sz="2000" dirty="0" err="1" smtClean="0">
+                <a:latin typeface="Segoe UI Light" pitchFamily="34" charset="0"/>
+                <a:cs typeface="Segoe UI Light" pitchFamily="34" charset="0"/>
+              </a:rPr>
+              <a:t>blooRow</a:t>
+            </a:r>
+            <a:r>
+              <a:rPr lang="en-AU" sz="2000" dirty="0" smtClean="0">
+                <a:latin typeface="Segoe UI Light" pitchFamily="34" charset="0"/>
+                <a:cs typeface="Segoe UI Light" pitchFamily="34" charset="0"/>
+              </a:rPr>
+              <a:t> = </a:t>
+            </a:r>
+            <a:r>
+              <a:rPr lang="en-AU" sz="2000" dirty="0" err="1" smtClean="0">
+                <a:latin typeface="Segoe UI Light" pitchFamily="34" charset="0"/>
+                <a:cs typeface="Segoe UI Light" pitchFamily="34" charset="0"/>
+              </a:rPr>
+              <a:t>rowsEnum.first</a:t>
+            </a:r>
+            <a:r>
+              <a:rPr lang="en-AU" sz="2000" dirty="0" smtClean="0">
+                <a:latin typeface="Segoe UI Light" pitchFamily="34" charset="0"/>
+                <a:cs typeface="Segoe UI Light" pitchFamily="34" charset="0"/>
+              </a:rPr>
+              <a:t>(“$.find(‘.foo’).text() === ‘</a:t>
+            </a:r>
+            <a:r>
+              <a:rPr lang="en-AU" sz="2000" dirty="0" err="1" smtClean="0">
+                <a:latin typeface="Segoe UI Light" pitchFamily="34" charset="0"/>
+                <a:cs typeface="Segoe UI Light" pitchFamily="34" charset="0"/>
+              </a:rPr>
+              <a:t>Bloo</a:t>
+            </a:r>
+            <a:r>
+              <a:rPr lang="en-AU" sz="2000" dirty="0" smtClean="0">
+                <a:latin typeface="Segoe UI Light" pitchFamily="34" charset="0"/>
+                <a:cs typeface="Segoe UI Light" pitchFamily="34" charset="0"/>
+              </a:rPr>
+              <a:t>’);</a:t>
+            </a:r>
+          </a:p>
+          <a:p>
+            <a:endParaRPr lang="en-AU" sz="2000" dirty="0">
+              <a:latin typeface="Segoe UI Light" pitchFamily="34" charset="0"/>
+              <a:cs typeface="Segoe UI Light" pitchFamily="34" charset="0"/>
+            </a:endParaRPr>
+          </a:p>
+          <a:p>
+            <a:r>
+              <a:rPr lang="en-AU" sz="2000" dirty="0" err="1" smtClean="0">
+                <a:latin typeface="Segoe UI Light" pitchFamily="34" charset="0"/>
+                <a:cs typeface="Segoe UI Light" pitchFamily="34" charset="0"/>
+              </a:rPr>
+              <a:t>var</a:t>
+            </a:r>
+            <a:r>
+              <a:rPr lang="en-AU" sz="2000" dirty="0" smtClean="0">
+                <a:latin typeface="Segoe UI Light" pitchFamily="34" charset="0"/>
+                <a:cs typeface="Segoe UI Light" pitchFamily="34" charset="0"/>
+              </a:rPr>
+              <a:t> </a:t>
+            </a:r>
+            <a:r>
+              <a:rPr lang="en-AU" sz="2000" dirty="0" err="1" smtClean="0">
+                <a:latin typeface="Segoe UI Light" pitchFamily="34" charset="0"/>
+                <a:cs typeface="Segoe UI Light" pitchFamily="34" charset="0"/>
+              </a:rPr>
+              <a:t>rowsArray</a:t>
+            </a:r>
+            <a:r>
+              <a:rPr lang="en-AU" sz="2000" dirty="0" smtClean="0">
+                <a:latin typeface="Segoe UI Light" pitchFamily="34" charset="0"/>
+                <a:cs typeface="Segoe UI Light" pitchFamily="34" charset="0"/>
+              </a:rPr>
+              <a:t> = </a:t>
+            </a:r>
+            <a:r>
+              <a:rPr lang="en-AU" sz="2000" dirty="0" err="1" smtClean="0">
+                <a:latin typeface="Segoe UI Light" pitchFamily="34" charset="0"/>
+                <a:cs typeface="Segoe UI Light" pitchFamily="34" charset="0"/>
+              </a:rPr>
+              <a:t>rowsEnum.select</a:t>
+            </a:r>
+            <a:r>
+              <a:rPr lang="en-AU" sz="2000" dirty="0" smtClean="0">
+                <a:latin typeface="Segoe UI Light" pitchFamily="34" charset="0"/>
+                <a:cs typeface="Segoe UI Light" pitchFamily="34" charset="0"/>
+              </a:rPr>
+              <a:t>(function(x) {</a:t>
+            </a:r>
+          </a:p>
+          <a:p>
+            <a:r>
+              <a:rPr lang="en-AU" sz="2000" dirty="0">
+                <a:latin typeface="Segoe UI Light" pitchFamily="34" charset="0"/>
+                <a:cs typeface="Segoe UI Light" pitchFamily="34" charset="0"/>
+              </a:rPr>
+              <a:t>	</a:t>
+            </a:r>
+            <a:r>
+              <a:rPr lang="en-AU" sz="2000" dirty="0" smtClean="0">
+                <a:latin typeface="Segoe UI Light" pitchFamily="34" charset="0"/>
+                <a:cs typeface="Segoe UI Light" pitchFamily="34" charset="0"/>
+              </a:rPr>
+              <a:t>	return { Foo: </a:t>
+            </a:r>
+            <a:r>
+              <a:rPr lang="en-AU" sz="2000" dirty="0" err="1" smtClean="0">
+                <a:latin typeface="Segoe UI Light" pitchFamily="34" charset="0"/>
+                <a:cs typeface="Segoe UI Light" pitchFamily="34" charset="0"/>
+              </a:rPr>
+              <a:t>x.find</a:t>
+            </a:r>
+            <a:r>
+              <a:rPr lang="en-AU" sz="2000" dirty="0" smtClean="0">
+                <a:latin typeface="Segoe UI Light" pitchFamily="34" charset="0"/>
+                <a:cs typeface="Segoe UI Light" pitchFamily="34" charset="0"/>
+              </a:rPr>
+              <a:t>(‘.foo’).text() };</a:t>
+            </a:r>
+          </a:p>
+          <a:p>
+            <a:r>
+              <a:rPr lang="en-AU" sz="2000" dirty="0">
+                <a:latin typeface="Segoe UI Light" pitchFamily="34" charset="0"/>
+                <a:cs typeface="Segoe UI Light" pitchFamily="34" charset="0"/>
+              </a:rPr>
+              <a:t>	</a:t>
+            </a:r>
+            <a:r>
+              <a:rPr lang="en-AU" sz="2000" dirty="0" smtClean="0">
+                <a:latin typeface="Segoe UI Light" pitchFamily="34" charset="0"/>
+                <a:cs typeface="Segoe UI Light" pitchFamily="34" charset="0"/>
+              </a:rPr>
+              <a:t>}).</a:t>
+            </a:r>
+            <a:r>
+              <a:rPr lang="en-AU" sz="2000" dirty="0" err="1" smtClean="0">
+                <a:latin typeface="Segoe UI Light" pitchFamily="34" charset="0"/>
+                <a:cs typeface="Segoe UI Light" pitchFamily="34" charset="0"/>
+              </a:rPr>
+              <a:t>toArray</a:t>
+            </a:r>
+            <a:r>
+              <a:rPr lang="en-AU" sz="2000" dirty="0" smtClean="0">
+                <a:latin typeface="Segoe UI Light" pitchFamily="34" charset="0"/>
+                <a:cs typeface="Segoe UI Light" pitchFamily="34" charset="0"/>
+              </a:rPr>
+              <a:t>();</a:t>
+            </a:r>
+            <a:endParaRPr lang="en-AU" sz="2000" dirty="0">
+              <a:latin typeface="Segoe UI Light" pitchFamily="34" charset="0"/>
+              <a:cs typeface="Segoe UI Light" pitchFamily="34" charset="0"/>
+            </a:endParaRPr>
+          </a:p>
+          <a:p>
+            <a:endParaRPr lang="en-AU" sz="2000" dirty="0">
               <a:latin typeface="Segoe UI Light" pitchFamily="34" charset="0"/>
               <a:cs typeface="Segoe UI Light" pitchFamily="34" charset="0"/>
             </a:endParaRPr>
@@ -19648,7 +21088,7 @@
     </p:spTree>
     <p:extLst>
       <p:ext uri="{BB962C8B-B14F-4D97-AF65-F5344CB8AC3E}">
-        <p14:creationId xmlns:p14="http://schemas.microsoft.com/office/powerpoint/2010/main" val="2051119352"/>
+        <p14:creationId xmlns:p14="http://schemas.microsoft.com/office/powerpoint/2010/main" val="3087838487"/>
       </p:ext>
     </p:extLst>
   </p:cSld>
@@ -19657,12 +21097,12 @@
   </p:clrMapOvr>
   <mc:AlternateContent xmlns:mc="http://schemas.openxmlformats.org/markup-compatibility/2006" xmlns:p14="http://schemas.microsoft.com/office/powerpoint/2010/main">
     <mc:Choice Requires="p14">
-      <p:transition spd="med" p14:dur="700" advClick="0" advTm="1000">
+      <p:transition spd="med" p14:dur="700">
         <p:fade/>
       </p:transition>
     </mc:Choice>
     <mc:Fallback xmlns="">
-      <p:transition spd="med" advClick="0" advTm="1000">
+      <p:transition spd="med">
         <p:fade/>
       </p:transition>
     </mc:Fallback>
@@ -20286,13 +21726,13 @@
 
 <file path=customXml/item1.xml><?xml version="1.0" encoding="utf-8"?>
 <Control xmlns="http://schemas.microsoft.com/VisualStudio/2011/storyboarding/control">
-  <Id Name="954fbc36-3a0b-451c-b6ca-7840e6cb93d2" Revision="1" Stencil="System.MyShapes" StencilVersion="1.0"/>
+  <Id Name="System.Storyboarding.Icons.Home" Revision="1" Stencil="System.Storyboarding.Icons" StencilVersion="0.1"/>
 </Control>
 </file>
 
 <file path=customXml/item10.xml><?xml version="1.0" encoding="utf-8"?>
 <Control xmlns="http://schemas.microsoft.com/VisualStudio/2011/storyboarding/control">
-  <Id Name="6dfc107e-125b-437f-92e7-0f56213fd11b" Revision="1" Stencil="System.MyShapes" StencilVersion="1.0"/>
+  <Id Name="39a674a8-40bb-4336-a613-085d185b153d" Revision="1" Stencil="System.MyShapes" StencilVersion="1.0"/>
 </Control>
 </file>
 
@@ -20310,37 +21750,37 @@
 
 <file path=customXml/item13.xml><?xml version="1.0" encoding="utf-8"?>
 <Control xmlns="http://schemas.microsoft.com/VisualStudio/2011/storyboarding/control">
-  <Id Name="2bfb8ed7-876e-4eb3-95a1-51a91bd7643c" Revision="1" Stencil="System.MyShapes" StencilVersion="1.0"/>
+  <Id Name="157be5d9-3fef-43bc-8766-a97f8ae76862" Revision="1" Stencil="System.MyShapes" StencilVersion="1.0"/>
 </Control>
 </file>
 
 <file path=customXml/item14.xml><?xml version="1.0" encoding="utf-8"?>
 <Control xmlns="http://schemas.microsoft.com/VisualStudio/2011/storyboarding/control">
-  <Id Name="f98c48eb-2373-4b07-b6c6-f292dbd8b1e1" Revision="1" Stencil="System.MyShapes" StencilVersion="1.0"/>
+  <Id Name="6dfc107e-125b-437f-92e7-0f56213fd11b" Revision="1" Stencil="System.MyShapes" StencilVersion="1.0"/>
 </Control>
 </file>
 
 <file path=customXml/item15.xml><?xml version="1.0" encoding="utf-8"?>
 <Control xmlns="http://schemas.microsoft.com/VisualStudio/2011/storyboarding/control">
-  <Id Name="157be5d9-3fef-43bc-8766-a97f8ae76862" Revision="1" Stencil="System.MyShapes" StencilVersion="1.0"/>
+  <Id Name="fac13148-34c3-4acb-912b-54923c1d3a08" Revision="1" Stencil="System.MyShapes" StencilVersion="1.0"/>
 </Control>
 </file>
 
 <file path=customXml/item16.xml><?xml version="1.0" encoding="utf-8"?>
 <Control xmlns="http://schemas.microsoft.com/VisualStudio/2011/storyboarding/control">
-  <Id Name="3cd24724-16e0-4ee9-97d1-99ee372f0bb4" Revision="1" Stencil="System.MyShapes" StencilVersion="1.0"/>
+  <Id Name="8c4c1ed6-c369-4a02-9e8a-2229551a0356" Revision="1" Stencil="System.MyShapes" StencilVersion="1.0"/>
 </Control>
 </file>
 
 <file path=customXml/item17.xml><?xml version="1.0" encoding="utf-8"?>
 <Control xmlns="http://schemas.microsoft.com/VisualStudio/2011/storyboarding/control">
-  <Id Name="a891fa5f-ced8-472a-a67e-2d761b6e580c" Revision="1" Stencil="System.MyShapes" StencilVersion="1.0"/>
+  <Id Name="f98c48eb-2373-4b07-b6c6-f292dbd8b1e1" Revision="1" Stencil="System.MyShapes" StencilVersion="1.0"/>
 </Control>
 </file>
 
 <file path=customXml/item2.xml><?xml version="1.0" encoding="utf-8"?>
 <Control xmlns="http://schemas.microsoft.com/VisualStudio/2011/storyboarding/control">
-  <Id Name="f6809765-2a10-4343-834c-9a8ebd1794cf" Revision="1" Stencil="System.MyShapes" StencilVersion="1.0"/>
+  <Id Name="2bfb8ed7-876e-4eb3-95a1-51a91bd7643c" Revision="1" Stencil="System.MyShapes" StencilVersion="1.0"/>
 </Control>
 </file>
 
@@ -20352,7 +21792,7 @@
 
 <file path=customXml/item4.xml><?xml version="1.0" encoding="utf-8"?>
 <Control xmlns="http://schemas.microsoft.com/VisualStudio/2011/storyboarding/control">
-  <Id Name="fac13148-34c3-4acb-912b-54923c1d3a08" Revision="1" Stencil="System.MyShapes" StencilVersion="1.0"/>
+  <Id Name="08100501-d26f-42ae-89f3-26e3b1ac9a44" Revision="1" Stencil="System.MyShapes" StencilVersion="1.0"/>
 </Control>
 </file>
 
@@ -20364,30 +21804,30 @@
 
 <file path=customXml/item6.xml><?xml version="1.0" encoding="utf-8"?>
 <Control xmlns="http://schemas.microsoft.com/VisualStudio/2011/storyboarding/control">
-  <Id Name="39a674a8-40bb-4336-a613-085d185b153d" Revision="1" Stencil="System.MyShapes" StencilVersion="1.0"/>
+  <Id Name="a891fa5f-ced8-472a-a67e-2d761b6e580c" Revision="1" Stencil="System.MyShapes" StencilVersion="1.0"/>
 </Control>
 </file>
 
 <file path=customXml/item7.xml><?xml version="1.0" encoding="utf-8"?>
 <Control xmlns="http://schemas.microsoft.com/VisualStudio/2011/storyboarding/control">
-  <Id Name="08100501-d26f-42ae-89f3-26e3b1ac9a44" Revision="1" Stencil="System.MyShapes" StencilVersion="1.0"/>
+  <Id Name="f6809765-2a10-4343-834c-9a8ebd1794cf" Revision="1" Stencil="System.MyShapes" StencilVersion="1.0"/>
 </Control>
 </file>
 
 <file path=customXml/item8.xml><?xml version="1.0" encoding="utf-8"?>
 <Control xmlns="http://schemas.microsoft.com/VisualStudio/2011/storyboarding/control">
-  <Id Name="System.Storyboarding.Icons.Home" Revision="1" Stencil="System.Storyboarding.Icons" StencilVersion="0.1"/>
+  <Id Name="3cd24724-16e0-4ee9-97d1-99ee372f0bb4" Revision="1" Stencil="System.MyShapes" StencilVersion="1.0"/>
 </Control>
 </file>
 
 <file path=customXml/item9.xml><?xml version="1.0" encoding="utf-8"?>
 <Control xmlns="http://schemas.microsoft.com/VisualStudio/2011/storyboarding/control">
-  <Id Name="8c4c1ed6-c369-4a02-9e8a-2229551a0356" Revision="1" Stencil="System.MyShapes" StencilVersion="1.0"/>
+  <Id Name="954fbc36-3a0b-451c-b6ca-7840e6cb93d2" Revision="1" Stencil="System.MyShapes" StencilVersion="1.0"/>
 </Control>
 </file>
 
 <file path=customXml/itemProps1.xml><?xml version="1.0" encoding="utf-8"?>
-<ds:datastoreItem xmlns:ds="http://schemas.openxmlformats.org/officeDocument/2006/customXml" ds:itemID="{CCB21AAA-7C1B-464F-8565-DEF8A9DC9C96}">
+<ds:datastoreItem xmlns:ds="http://schemas.openxmlformats.org/officeDocument/2006/customXml" ds:itemID="{D39F8ACB-B4FF-421A-9A46-C62C32F09460}">
   <ds:schemaRefs>
     <ds:schemaRef ds:uri="http://schemas.microsoft.com/VisualStudio/2011/storyboarding/control"/>
   </ds:schemaRefs>
@@ -20395,7 +21835,7 @@
 </file>
 
 <file path=customXml/itemProps10.xml><?xml version="1.0" encoding="utf-8"?>
-<ds:datastoreItem xmlns:ds="http://schemas.openxmlformats.org/officeDocument/2006/customXml" ds:itemID="{FA948E3E-DD02-4878-82C7-0733F2C786B1}">
+<ds:datastoreItem xmlns:ds="http://schemas.openxmlformats.org/officeDocument/2006/customXml" ds:itemID="{778832B0-4806-43D3-8738-870F35681E84}">
   <ds:schemaRefs>
     <ds:schemaRef ds:uri="http://schemas.microsoft.com/VisualStudio/2011/storyboarding/control"/>
   </ds:schemaRefs>
@@ -20411,7 +21851,7 @@
 </file>
 
 <file path=customXml/itemProps12.xml><?xml version="1.0" encoding="utf-8"?>
-<ds:datastoreItem xmlns:ds="http://schemas.openxmlformats.org/officeDocument/2006/customXml" ds:itemID="{F57C67B5-EC59-E64A-B52F-F91ECBA20C15}">
+<ds:datastoreItem xmlns:ds="http://schemas.openxmlformats.org/officeDocument/2006/customXml" ds:itemID="{0EF59F15-04D3-D04E-85BC-6C9028104F32}">
   <ds:schemaRefs>
     <ds:schemaRef ds:uri="http://schemas.microsoft.com/VisualStudio/2011/storyboarding/control"/>
   </ds:schemaRefs>
@@ -20419,7 +21859,7 @@
 </file>
 
 <file path=customXml/itemProps13.xml><?xml version="1.0" encoding="utf-8"?>
-<ds:datastoreItem xmlns:ds="http://schemas.openxmlformats.org/officeDocument/2006/customXml" ds:itemID="{486A8FDA-4BD7-0E40-B402-18071B6A3C94}">
+<ds:datastoreItem xmlns:ds="http://schemas.openxmlformats.org/officeDocument/2006/customXml" ds:itemID="{15F274C0-0FD3-4839-9399-C68B35FE16D7}">
   <ds:schemaRefs>
     <ds:schemaRef ds:uri="http://schemas.microsoft.com/VisualStudio/2011/storyboarding/control"/>
   </ds:schemaRefs>
@@ -20427,6 +21867,30 @@
 </file>
 
 <file path=customXml/itemProps14.xml><?xml version="1.0" encoding="utf-8"?>
+<ds:datastoreItem xmlns:ds="http://schemas.openxmlformats.org/officeDocument/2006/customXml" ds:itemID="{FA948E3E-DD02-4878-82C7-0733F2C786B1}">
+  <ds:schemaRefs>
+    <ds:schemaRef ds:uri="http://schemas.microsoft.com/VisualStudio/2011/storyboarding/control"/>
+  </ds:schemaRefs>
+</ds:datastoreItem>
+</file>
+
+<file path=customXml/itemProps15.xml><?xml version="1.0" encoding="utf-8"?>
+<ds:datastoreItem xmlns:ds="http://schemas.openxmlformats.org/officeDocument/2006/customXml" ds:itemID="{5FBA34B1-0827-4CE7-B370-308B3742B2EF}">
+  <ds:schemaRefs>
+    <ds:schemaRef ds:uri="http://schemas.microsoft.com/VisualStudio/2011/storyboarding/control"/>
+  </ds:schemaRefs>
+</ds:datastoreItem>
+</file>
+
+<file path=customXml/itemProps16.xml><?xml version="1.0" encoding="utf-8"?>
+<ds:datastoreItem xmlns:ds="http://schemas.openxmlformats.org/officeDocument/2006/customXml" ds:itemID="{4D384E22-55B4-4D7D-A114-8A1617387682}">
+  <ds:schemaRefs>
+    <ds:schemaRef ds:uri="http://schemas.microsoft.com/VisualStudio/2011/storyboarding/control"/>
+  </ds:schemaRefs>
+</ds:datastoreItem>
+</file>
+
+<file path=customXml/itemProps17.xml><?xml version="1.0" encoding="utf-8"?>
 <ds:datastoreItem xmlns:ds="http://schemas.openxmlformats.org/officeDocument/2006/customXml" ds:itemID="{7D796AB7-B2B4-45E2-B104-3647EF701933}">
   <ds:schemaRefs>
     <ds:schemaRef ds:uri="http://schemas.microsoft.com/VisualStudio/2011/storyboarding/control"/>
@@ -20434,32 +21898,8 @@
 </ds:datastoreItem>
 </file>
 
-<file path=customXml/itemProps15.xml><?xml version="1.0" encoding="utf-8"?>
-<ds:datastoreItem xmlns:ds="http://schemas.openxmlformats.org/officeDocument/2006/customXml" ds:itemID="{15F274C0-0FD3-4839-9399-C68B35FE16D7}">
-  <ds:schemaRefs>
-    <ds:schemaRef ds:uri="http://schemas.microsoft.com/VisualStudio/2011/storyboarding/control"/>
-  </ds:schemaRefs>
-</ds:datastoreItem>
-</file>
-
-<file path=customXml/itemProps16.xml><?xml version="1.0" encoding="utf-8"?>
-<ds:datastoreItem xmlns:ds="http://schemas.openxmlformats.org/officeDocument/2006/customXml" ds:itemID="{6F01E4A1-5D94-4A9A-A48D-E4FB02E2175C}">
-  <ds:schemaRefs>
-    <ds:schemaRef ds:uri="http://schemas.microsoft.com/VisualStudio/2011/storyboarding/control"/>
-  </ds:schemaRefs>
-</ds:datastoreItem>
-</file>
-
-<file path=customXml/itemProps17.xml><?xml version="1.0" encoding="utf-8"?>
-<ds:datastoreItem xmlns:ds="http://schemas.openxmlformats.org/officeDocument/2006/customXml" ds:itemID="{FFA6C37A-C2FE-49EB-842B-65619C9F730D}">
-  <ds:schemaRefs>
-    <ds:schemaRef ds:uri="http://schemas.microsoft.com/VisualStudio/2011/storyboarding/control"/>
-  </ds:schemaRefs>
-</ds:datastoreItem>
-</file>
-
 <file path=customXml/itemProps2.xml><?xml version="1.0" encoding="utf-8"?>
-<ds:datastoreItem xmlns:ds="http://schemas.openxmlformats.org/officeDocument/2006/customXml" ds:itemID="{ADCD8A78-3EE7-41EA-B722-CF19F911800E}">
+<ds:datastoreItem xmlns:ds="http://schemas.openxmlformats.org/officeDocument/2006/customXml" ds:itemID="{486A8FDA-4BD7-0E40-B402-18071B6A3C94}">
   <ds:schemaRefs>
     <ds:schemaRef ds:uri="http://schemas.microsoft.com/VisualStudio/2011/storyboarding/control"/>
   </ds:schemaRefs>
@@ -20475,7 +21915,7 @@
 </file>
 
 <file path=customXml/itemProps4.xml><?xml version="1.0" encoding="utf-8"?>
-<ds:datastoreItem xmlns:ds="http://schemas.openxmlformats.org/officeDocument/2006/customXml" ds:itemID="{5FBA34B1-0827-4CE7-B370-308B3742B2EF}">
+<ds:datastoreItem xmlns:ds="http://schemas.openxmlformats.org/officeDocument/2006/customXml" ds:itemID="{3722F413-17A2-429B-AE65-91F0C6D2F7F6}">
   <ds:schemaRefs>
     <ds:schemaRef ds:uri="http://schemas.microsoft.com/VisualStudio/2011/storyboarding/control"/>
   </ds:schemaRefs>
@@ -20483,7 +21923,7 @@
 </file>
 
 <file path=customXml/itemProps5.xml><?xml version="1.0" encoding="utf-8"?>
-<ds:datastoreItem xmlns:ds="http://schemas.openxmlformats.org/officeDocument/2006/customXml" ds:itemID="{0EF59F15-04D3-D04E-85BC-6C9028104F32}">
+<ds:datastoreItem xmlns:ds="http://schemas.openxmlformats.org/officeDocument/2006/customXml" ds:itemID="{F57C67B5-EC59-E64A-B52F-F91ECBA20C15}">
   <ds:schemaRefs>
     <ds:schemaRef ds:uri="http://schemas.microsoft.com/VisualStudio/2011/storyboarding/control"/>
   </ds:schemaRefs>
@@ -20491,7 +21931,7 @@
 </file>
 
 <file path=customXml/itemProps6.xml><?xml version="1.0" encoding="utf-8"?>
-<ds:datastoreItem xmlns:ds="http://schemas.openxmlformats.org/officeDocument/2006/customXml" ds:itemID="{778832B0-4806-43D3-8738-870F35681E84}">
+<ds:datastoreItem xmlns:ds="http://schemas.openxmlformats.org/officeDocument/2006/customXml" ds:itemID="{FFA6C37A-C2FE-49EB-842B-65619C9F730D}">
   <ds:schemaRefs>
     <ds:schemaRef ds:uri="http://schemas.microsoft.com/VisualStudio/2011/storyboarding/control"/>
   </ds:schemaRefs>
@@ -20499,7 +21939,7 @@
 </file>
 
 <file path=customXml/itemProps7.xml><?xml version="1.0" encoding="utf-8"?>
-<ds:datastoreItem xmlns:ds="http://schemas.openxmlformats.org/officeDocument/2006/customXml" ds:itemID="{3722F413-17A2-429B-AE65-91F0C6D2F7F6}">
+<ds:datastoreItem xmlns:ds="http://schemas.openxmlformats.org/officeDocument/2006/customXml" ds:itemID="{ADCD8A78-3EE7-41EA-B722-CF19F911800E}">
   <ds:schemaRefs>
     <ds:schemaRef ds:uri="http://schemas.microsoft.com/VisualStudio/2011/storyboarding/control"/>
   </ds:schemaRefs>
@@ -20507,7 +21947,7 @@
 </file>
 
 <file path=customXml/itemProps8.xml><?xml version="1.0" encoding="utf-8"?>
-<ds:datastoreItem xmlns:ds="http://schemas.openxmlformats.org/officeDocument/2006/customXml" ds:itemID="{D39F8ACB-B4FF-421A-9A46-C62C32F09460}">
+<ds:datastoreItem xmlns:ds="http://schemas.openxmlformats.org/officeDocument/2006/customXml" ds:itemID="{6F01E4A1-5D94-4A9A-A48D-E4FB02E2175C}">
   <ds:schemaRefs>
     <ds:schemaRef ds:uri="http://schemas.microsoft.com/VisualStudio/2011/storyboarding/control"/>
   </ds:schemaRefs>
@@ -20515,7 +21955,7 @@
 </file>
 
 <file path=customXml/itemProps9.xml><?xml version="1.0" encoding="utf-8"?>
-<ds:datastoreItem xmlns:ds="http://schemas.openxmlformats.org/officeDocument/2006/customXml" ds:itemID="{4D384E22-55B4-4D7D-A114-8A1617387682}">
+<ds:datastoreItem xmlns:ds="http://schemas.openxmlformats.org/officeDocument/2006/customXml" ds:itemID="{CCB21AAA-7C1B-464F-8565-DEF8A9DC9C96}">
   <ds:schemaRefs>
     <ds:schemaRef ds:uri="http://schemas.microsoft.com/VisualStudio/2011/storyboarding/control"/>
   </ds:schemaRefs>

</xml_diff>